<commit_message>
Cleaned up the code. Added script to set permissions for files. Added install instructions (README.html) Updated test scripts.
</commit_message>
<xml_diff>
--- a/SamPresentation.pptx
+++ b/SamPresentation.pptx
@@ -296,7 +296,8 @@
           <a:p>
             <a:fld id="{F5171E49-61C0-4B63-A2BA-8260F4CF6852}" type="datetimeFigureOut">
               <a:rPr lang="en-US" smtClean="0"/>
-              <a:t>4/19/2011</a:t>
+              <a:pPr/>
+              <a:t>4/20/2011</a:t>
             </a:fld>
             <a:endParaRPr lang="en-US"/>
           </a:p>
@@ -338,6 +339,7 @@
           <a:p>
             <a:fld id="{9D4DBCAF-AB58-4772-8482-8241D0C927CE}" type="slidenum">
               <a:rPr lang="en-US" smtClean="0"/>
+              <a:pPr/>
               <a:t>‹#›</a:t>
             </a:fld>
             <a:endParaRPr lang="en-US"/>
@@ -461,7 +463,8 @@
           <a:p>
             <a:fld id="{F5171E49-61C0-4B63-A2BA-8260F4CF6852}" type="datetimeFigureOut">
               <a:rPr lang="en-US" smtClean="0"/>
-              <a:t>4/19/2011</a:t>
+              <a:pPr/>
+              <a:t>4/20/2011</a:t>
             </a:fld>
             <a:endParaRPr lang="en-US"/>
           </a:p>
@@ -503,6 +506,7 @@
           <a:p>
             <a:fld id="{9D4DBCAF-AB58-4772-8482-8241D0C927CE}" type="slidenum">
               <a:rPr lang="en-US" smtClean="0"/>
+              <a:pPr/>
               <a:t>‹#›</a:t>
             </a:fld>
             <a:endParaRPr lang="en-US"/>
@@ -636,7 +640,8 @@
           <a:p>
             <a:fld id="{F5171E49-61C0-4B63-A2BA-8260F4CF6852}" type="datetimeFigureOut">
               <a:rPr lang="en-US" smtClean="0"/>
-              <a:t>4/19/2011</a:t>
+              <a:pPr/>
+              <a:t>4/20/2011</a:t>
             </a:fld>
             <a:endParaRPr lang="en-US"/>
           </a:p>
@@ -678,6 +683,7 @@
           <a:p>
             <a:fld id="{9D4DBCAF-AB58-4772-8482-8241D0C927CE}" type="slidenum">
               <a:rPr lang="en-US" smtClean="0"/>
+              <a:pPr/>
               <a:t>‹#›</a:t>
             </a:fld>
             <a:endParaRPr lang="en-US"/>
@@ -801,7 +807,8 @@
           <a:p>
             <a:fld id="{F5171E49-61C0-4B63-A2BA-8260F4CF6852}" type="datetimeFigureOut">
               <a:rPr lang="en-US" smtClean="0"/>
-              <a:t>4/19/2011</a:t>
+              <a:pPr/>
+              <a:t>4/20/2011</a:t>
             </a:fld>
             <a:endParaRPr lang="en-US"/>
           </a:p>
@@ -843,6 +850,7 @@
           <a:p>
             <a:fld id="{9D4DBCAF-AB58-4772-8482-8241D0C927CE}" type="slidenum">
               <a:rPr lang="en-US" smtClean="0"/>
+              <a:pPr/>
               <a:t>‹#›</a:t>
             </a:fld>
             <a:endParaRPr lang="en-US"/>
@@ -1042,7 +1050,8 @@
           <a:p>
             <a:fld id="{F5171E49-61C0-4B63-A2BA-8260F4CF6852}" type="datetimeFigureOut">
               <a:rPr lang="en-US" smtClean="0"/>
-              <a:t>4/19/2011</a:t>
+              <a:pPr/>
+              <a:t>4/20/2011</a:t>
             </a:fld>
             <a:endParaRPr lang="en-US"/>
           </a:p>
@@ -1084,6 +1093,7 @@
           <a:p>
             <a:fld id="{9D4DBCAF-AB58-4772-8482-8241D0C927CE}" type="slidenum">
               <a:rPr lang="en-US" smtClean="0"/>
+              <a:pPr/>
               <a:t>‹#›</a:t>
             </a:fld>
             <a:endParaRPr lang="en-US"/>
@@ -1325,7 +1335,8 @@
           <a:p>
             <a:fld id="{F5171E49-61C0-4B63-A2BA-8260F4CF6852}" type="datetimeFigureOut">
               <a:rPr lang="en-US" smtClean="0"/>
-              <a:t>4/19/2011</a:t>
+              <a:pPr/>
+              <a:t>4/20/2011</a:t>
             </a:fld>
             <a:endParaRPr lang="en-US"/>
           </a:p>
@@ -1367,6 +1378,7 @@
           <a:p>
             <a:fld id="{9D4DBCAF-AB58-4772-8482-8241D0C927CE}" type="slidenum">
               <a:rPr lang="en-US" smtClean="0"/>
+              <a:pPr/>
               <a:t>‹#›</a:t>
             </a:fld>
             <a:endParaRPr lang="en-US"/>
@@ -1742,7 +1754,8 @@
           <a:p>
             <a:fld id="{F5171E49-61C0-4B63-A2BA-8260F4CF6852}" type="datetimeFigureOut">
               <a:rPr lang="en-US" smtClean="0"/>
-              <a:t>4/19/2011</a:t>
+              <a:pPr/>
+              <a:t>4/20/2011</a:t>
             </a:fld>
             <a:endParaRPr lang="en-US"/>
           </a:p>
@@ -1784,6 +1797,7 @@
           <a:p>
             <a:fld id="{9D4DBCAF-AB58-4772-8482-8241D0C927CE}" type="slidenum">
               <a:rPr lang="en-US" smtClean="0"/>
+              <a:pPr/>
               <a:t>‹#›</a:t>
             </a:fld>
             <a:endParaRPr lang="en-US"/>
@@ -1855,7 +1869,8 @@
           <a:p>
             <a:fld id="{F5171E49-61C0-4B63-A2BA-8260F4CF6852}" type="datetimeFigureOut">
               <a:rPr lang="en-US" smtClean="0"/>
-              <a:t>4/19/2011</a:t>
+              <a:pPr/>
+              <a:t>4/20/2011</a:t>
             </a:fld>
             <a:endParaRPr lang="en-US"/>
           </a:p>
@@ -1897,6 +1912,7 @@
           <a:p>
             <a:fld id="{9D4DBCAF-AB58-4772-8482-8241D0C927CE}" type="slidenum">
               <a:rPr lang="en-US" smtClean="0"/>
+              <a:pPr/>
               <a:t>‹#›</a:t>
             </a:fld>
             <a:endParaRPr lang="en-US"/>
@@ -1945,7 +1961,8 @@
           <a:p>
             <a:fld id="{F5171E49-61C0-4B63-A2BA-8260F4CF6852}" type="datetimeFigureOut">
               <a:rPr lang="en-US" smtClean="0"/>
-              <a:t>4/19/2011</a:t>
+              <a:pPr/>
+              <a:t>4/20/2011</a:t>
             </a:fld>
             <a:endParaRPr lang="en-US"/>
           </a:p>
@@ -1987,6 +2004,7 @@
           <a:p>
             <a:fld id="{9D4DBCAF-AB58-4772-8482-8241D0C927CE}" type="slidenum">
               <a:rPr lang="en-US" smtClean="0"/>
+              <a:pPr/>
               <a:t>‹#›</a:t>
             </a:fld>
             <a:endParaRPr lang="en-US"/>
@@ -2217,7 +2235,8 @@
           <a:p>
             <a:fld id="{F5171E49-61C0-4B63-A2BA-8260F4CF6852}" type="datetimeFigureOut">
               <a:rPr lang="en-US" smtClean="0"/>
-              <a:t>4/19/2011</a:t>
+              <a:pPr/>
+              <a:t>4/20/2011</a:t>
             </a:fld>
             <a:endParaRPr lang="en-US"/>
           </a:p>
@@ -2259,6 +2278,7 @@
           <a:p>
             <a:fld id="{9D4DBCAF-AB58-4772-8482-8241D0C927CE}" type="slidenum">
               <a:rPr lang="en-US" smtClean="0"/>
+              <a:pPr/>
               <a:t>‹#›</a:t>
             </a:fld>
             <a:endParaRPr lang="en-US"/>
@@ -2465,7 +2485,8 @@
           <a:p>
             <a:fld id="{F5171E49-61C0-4B63-A2BA-8260F4CF6852}" type="datetimeFigureOut">
               <a:rPr lang="en-US" smtClean="0"/>
-              <a:t>4/19/2011</a:t>
+              <a:pPr/>
+              <a:t>4/20/2011</a:t>
             </a:fld>
             <a:endParaRPr lang="en-US"/>
           </a:p>
@@ -2507,6 +2528,7 @@
           <a:p>
             <a:fld id="{9D4DBCAF-AB58-4772-8482-8241D0C927CE}" type="slidenum">
               <a:rPr lang="en-US" smtClean="0"/>
+              <a:pPr/>
               <a:t>‹#›</a:t>
             </a:fld>
             <a:endParaRPr lang="en-US"/>
@@ -2673,7 +2695,8 @@
           <a:p>
             <a:fld id="{F5171E49-61C0-4B63-A2BA-8260F4CF6852}" type="datetimeFigureOut">
               <a:rPr lang="en-US" smtClean="0"/>
-              <a:t>4/19/2011</a:t>
+              <a:pPr/>
+              <a:t>4/20/2011</a:t>
             </a:fld>
             <a:endParaRPr lang="en-US"/>
           </a:p>
@@ -2751,6 +2774,7 @@
           <a:p>
             <a:fld id="{9D4DBCAF-AB58-4772-8482-8241D0C927CE}" type="slidenum">
               <a:rPr lang="en-US" smtClean="0"/>
+              <a:pPr/>
               <a:t>‹#›</a:t>
             </a:fld>
             <a:endParaRPr lang="en-US"/>
@@ -3367,10 +3391,15 @@
             <p:ph idx="1"/>
           </p:nvPr>
         </p:nvSpPr>
-        <p:spPr/>
+        <p:spPr>
+          <a:xfrm>
+            <a:off x="457200" y="1600200"/>
+            <a:ext cx="8229600" cy="4800600"/>
+          </a:xfrm>
+        </p:spPr>
         <p:txBody>
           <a:bodyPr>
-            <a:normAutofit/>
+            <a:normAutofit fontScale="92500" lnSpcReduction="20000"/>
           </a:bodyPr>
           <a:lstStyle/>
           <a:p>
@@ -3400,18 +3429,18 @@
             <a:pPr lvl="1"/>
             <a:r>
               <a:rPr lang="en-US" dirty="0" smtClean="0"/>
-              <a:t>Helps with Ajax requests</a:t>
+              <a:t>Helps with Ajax </a:t>
+            </a:r>
+            <a:r>
+              <a:rPr lang="en-US" dirty="0" smtClean="0"/>
+              <a:t>requests and event handling</a:t>
             </a:r>
             <a:endParaRPr lang="en-US" dirty="0"/>
           </a:p>
           <a:p>
             <a:r>
-              <a:rPr lang="en-US" dirty="0" err="1"/>
-              <a:t>B</a:t>
-            </a:r>
-            <a:r>
               <a:rPr lang="en-US" dirty="0" err="1" smtClean="0"/>
-              <a:t>lockUI</a:t>
+              <a:t>BlockUI</a:t>
             </a:r>
             <a:r>
               <a:rPr lang="en-US" dirty="0" smtClean="0"/>
@@ -3435,15 +3464,58 @@
             <a:pPr lvl="1"/>
             <a:r>
               <a:rPr lang="en-US" dirty="0" smtClean="0"/>
-              <a:t>Simulate synchronous Ajax behavior without locking the browser</a:t>
+              <a:t>Simulate synchronous Ajax behavior without locking the </a:t>
+            </a:r>
+            <a:r>
+              <a:rPr lang="en-US" dirty="0" smtClean="0"/>
+              <a:t>browser</a:t>
             </a:r>
           </a:p>
           <a:p>
             <a:pPr lvl="1"/>
             <a:r>
               <a:rPr lang="en-US" dirty="0" smtClean="0"/>
-              <a:t>http://jquery.malsup.com/block/</a:t>
-            </a:r>
+              <a:t>http://jquery.malsup.com/block</a:t>
+            </a:r>
+            <a:r>
+              <a:rPr lang="en-US" dirty="0" smtClean="0"/>
+              <a:t>/</a:t>
+            </a:r>
+            <a:endParaRPr lang="en-US" dirty="0" smtClean="0"/>
+          </a:p>
+          <a:p>
+            <a:r>
+              <a:rPr lang="en-US" dirty="0" smtClean="0"/>
+              <a:t>Google-</a:t>
+            </a:r>
+            <a:r>
+              <a:rPr lang="en-US" dirty="0" err="1" smtClean="0"/>
+              <a:t>gson</a:t>
+            </a:r>
+            <a:endParaRPr lang="en-US" dirty="0" smtClean="0"/>
+          </a:p>
+          <a:p>
+            <a:pPr lvl="1"/>
+            <a:r>
+              <a:rPr lang="en-US" dirty="0" smtClean="0"/>
+              <a:t>Serialize Java Objects into JSON Objects</a:t>
+            </a:r>
+          </a:p>
+          <a:p>
+            <a:pPr lvl="1"/>
+            <a:r>
+              <a:rPr lang="en-US" dirty="0" smtClean="0"/>
+              <a:t>http://</a:t>
+            </a:r>
+            <a:r>
+              <a:rPr lang="en-US" dirty="0" smtClean="0"/>
+              <a:t>code.google.com/p/google-gson</a:t>
+            </a:r>
+            <a:r>
+              <a:rPr lang="en-US" dirty="0" smtClean="0"/>
+              <a:t>/</a:t>
+            </a:r>
+            <a:endParaRPr lang="en-US" dirty="0" smtClean="0"/>
           </a:p>
         </p:txBody>
       </p:sp>

</xml_diff>

<commit_message>
Added plots. Presentation update.
</commit_message>
<xml_diff>
--- a/SamPresentation.pptx
+++ b/SamPresentation.pptx
@@ -5,7 +5,7 @@
     <p:sldMasterId id="2147483648" r:id="rId1"/>
   </p:sldMasterIdLst>
   <p:notesMasterIdLst>
-    <p:notesMasterId r:id="rId13"/>
+    <p:notesMasterId r:id="rId18"/>
   </p:notesMasterIdLst>
   <p:sldIdLst>
     <p:sldId id="261" r:id="rId2"/>
@@ -18,7 +18,12 @@
     <p:sldId id="262" r:id="rId9"/>
     <p:sldId id="263" r:id="rId10"/>
     <p:sldId id="264" r:id="rId11"/>
-    <p:sldId id="265" r:id="rId12"/>
+    <p:sldId id="269" r:id="rId12"/>
+    <p:sldId id="270" r:id="rId13"/>
+    <p:sldId id="271" r:id="rId14"/>
+    <p:sldId id="272" r:id="rId15"/>
+    <p:sldId id="268" r:id="rId16"/>
+    <p:sldId id="265" r:id="rId17"/>
   </p:sldIdLst>
   <p:sldSz cx="9144000" cy="6858000" type="screen4x3"/>
   <p:notesSz cx="6858000" cy="9144000"/>
@@ -203,7 +208,7 @@
             <a:fld id="{6E61956B-DC5B-4979-9B06-748A0538A2C7}" type="datetimeFigureOut">
               <a:rPr lang="en-US" smtClean="0"/>
               <a:pPr/>
-              <a:t>4/29/2011</a:t>
+              <a:t>5/4/2011</a:t>
             </a:fld>
             <a:endParaRPr lang="en-US"/>
           </a:p>
@@ -1026,11 +1031,7 @@
             </a:r>
             <a:r>
               <a:rPr lang="en-US" baseline="0" dirty="0" smtClean="0"/>
-              <a:t> to determine the values for other variables. The method returns the values for all the variables and the reasons that they have the values</a:t>
-            </a:r>
-            <a:r>
-              <a:rPr lang="en-US" baseline="0" dirty="0" smtClean="0"/>
-              <a:t>.</a:t>
+              <a:t> to determine the values for other variables. The method returns the values for all the variables and the reasons that they have the values.</a:t>
             </a:r>
           </a:p>
           <a:p>
@@ -1626,7 +1627,7 @@
             <a:fld id="{B3822314-6588-4D35-B84D-1FB9C9EAAB81}" type="slidenum">
               <a:rPr lang="en-US" smtClean="0"/>
               <a:pPr/>
-              <a:t>11</a:t>
+              <a:t>16</a:t>
             </a:fld>
             <a:endParaRPr lang="en-US"/>
           </a:p>
@@ -1822,7 +1823,7 @@
             <a:fld id="{F5171E49-61C0-4B63-A2BA-8260F4CF6852}" type="datetimeFigureOut">
               <a:rPr lang="en-US" smtClean="0"/>
               <a:pPr/>
-              <a:t>4/29/2011</a:t>
+              <a:t>5/4/2011</a:t>
             </a:fld>
             <a:endParaRPr lang="en-US"/>
           </a:p>
@@ -1989,7 +1990,7 @@
             <a:fld id="{F5171E49-61C0-4B63-A2BA-8260F4CF6852}" type="datetimeFigureOut">
               <a:rPr lang="en-US" smtClean="0"/>
               <a:pPr/>
-              <a:t>4/29/2011</a:t>
+              <a:t>5/4/2011</a:t>
             </a:fld>
             <a:endParaRPr lang="en-US"/>
           </a:p>
@@ -2166,7 +2167,7 @@
             <a:fld id="{F5171E49-61C0-4B63-A2BA-8260F4CF6852}" type="datetimeFigureOut">
               <a:rPr lang="en-US" smtClean="0"/>
               <a:pPr/>
-              <a:t>4/29/2011</a:t>
+              <a:t>5/4/2011</a:t>
             </a:fld>
             <a:endParaRPr lang="en-US"/>
           </a:p>
@@ -2333,7 +2334,7 @@
             <a:fld id="{F5171E49-61C0-4B63-A2BA-8260F4CF6852}" type="datetimeFigureOut">
               <a:rPr lang="en-US" smtClean="0"/>
               <a:pPr/>
-              <a:t>4/29/2011</a:t>
+              <a:t>5/4/2011</a:t>
             </a:fld>
             <a:endParaRPr lang="en-US"/>
           </a:p>
@@ -2576,7 +2577,7 @@
             <a:fld id="{F5171E49-61C0-4B63-A2BA-8260F4CF6852}" type="datetimeFigureOut">
               <a:rPr lang="en-US" smtClean="0"/>
               <a:pPr/>
-              <a:t>4/29/2011</a:t>
+              <a:t>5/4/2011</a:t>
             </a:fld>
             <a:endParaRPr lang="en-US"/>
           </a:p>
@@ -2861,7 +2862,7 @@
             <a:fld id="{F5171E49-61C0-4B63-A2BA-8260F4CF6852}" type="datetimeFigureOut">
               <a:rPr lang="en-US" smtClean="0"/>
               <a:pPr/>
-              <a:t>4/29/2011</a:t>
+              <a:t>5/4/2011</a:t>
             </a:fld>
             <a:endParaRPr lang="en-US"/>
           </a:p>
@@ -3280,7 +3281,7 @@
             <a:fld id="{F5171E49-61C0-4B63-A2BA-8260F4CF6852}" type="datetimeFigureOut">
               <a:rPr lang="en-US" smtClean="0"/>
               <a:pPr/>
-              <a:t>4/29/2011</a:t>
+              <a:t>5/4/2011</a:t>
             </a:fld>
             <a:endParaRPr lang="en-US"/>
           </a:p>
@@ -3395,7 +3396,7 @@
             <a:fld id="{F5171E49-61C0-4B63-A2BA-8260F4CF6852}" type="datetimeFigureOut">
               <a:rPr lang="en-US" smtClean="0"/>
               <a:pPr/>
-              <a:t>4/29/2011</a:t>
+              <a:t>5/4/2011</a:t>
             </a:fld>
             <a:endParaRPr lang="en-US"/>
           </a:p>
@@ -3487,7 +3488,7 @@
             <a:fld id="{F5171E49-61C0-4B63-A2BA-8260F4CF6852}" type="datetimeFigureOut">
               <a:rPr lang="en-US" smtClean="0"/>
               <a:pPr/>
-              <a:t>4/29/2011</a:t>
+              <a:t>5/4/2011</a:t>
             </a:fld>
             <a:endParaRPr lang="en-US"/>
           </a:p>
@@ -3761,7 +3762,7 @@
             <a:fld id="{F5171E49-61C0-4B63-A2BA-8260F4CF6852}" type="datetimeFigureOut">
               <a:rPr lang="en-US" smtClean="0"/>
               <a:pPr/>
-              <a:t>4/29/2011</a:t>
+              <a:t>5/4/2011</a:t>
             </a:fld>
             <a:endParaRPr lang="en-US"/>
           </a:p>
@@ -4011,7 +4012,7 @@
             <a:fld id="{F5171E49-61C0-4B63-A2BA-8260F4CF6852}" type="datetimeFigureOut">
               <a:rPr lang="en-US" smtClean="0"/>
               <a:pPr/>
-              <a:t>4/29/2011</a:t>
+              <a:t>5/4/2011</a:t>
             </a:fld>
             <a:endParaRPr lang="en-US"/>
           </a:p>
@@ -4221,7 +4222,7 @@
             <a:fld id="{F5171E49-61C0-4B63-A2BA-8260F4CF6852}" type="datetimeFigureOut">
               <a:rPr lang="en-US" smtClean="0"/>
               <a:pPr/>
-              <a:t>4/29/2011</a:t>
+              <a:t>5/4/2011</a:t>
             </a:fld>
             <a:endParaRPr lang="en-US"/>
           </a:p>
@@ -4666,48 +4667,140 @@
           <a:chExt cx="0" cy="0"/>
         </a:xfrm>
       </p:grpSpPr>
-      <p:sp>
-        <p:nvSpPr>
-          <p:cNvPr id="2" name="Title 1"/>
-          <p:cNvSpPr>
-            <a:spLocks noGrp="1"/>
-          </p:cNvSpPr>
-          <p:nvPr>
-            <p:ph type="title"/>
-          </p:nvPr>
-        </p:nvSpPr>
-        <p:spPr/>
-        <p:txBody>
-          <a:bodyPr/>
-          <a:lstStyle/>
-          <a:p>
-            <a:r>
-              <a:rPr lang="en-US" dirty="0" smtClean="0"/>
-              <a:t>Results</a:t>
-            </a:r>
-            <a:endParaRPr lang="en-US" dirty="0"/>
-          </a:p>
-        </p:txBody>
-      </p:sp>
-      <p:sp>
-        <p:nvSpPr>
-          <p:cNvPr id="3" name="Content Placeholder 2"/>
-          <p:cNvSpPr>
-            <a:spLocks noGrp="1"/>
-          </p:cNvSpPr>
+      <p:pic>
+        <p:nvPicPr>
+          <p:cNvPr id="4" name="Content Placeholder 3" descr="cycle.randommultigraph.txt.png"/>
+          <p:cNvPicPr>
+            <a:picLocks noGrp="1" noChangeAspect="1"/>
+          </p:cNvPicPr>
           <p:nvPr>
             <p:ph idx="1"/>
           </p:nvPr>
-        </p:nvSpPr>
-        <p:spPr/>
-        <p:txBody>
-          <a:bodyPr/>
-          <a:lstStyle/>
-          <a:p>
-            <a:endParaRPr lang="en-US"/>
-          </a:p>
-        </p:txBody>
-      </p:sp>
+        </p:nvPicPr>
+        <p:blipFill>
+          <a:blip r:embed="rId2" cstate="print"/>
+          <a:stretch>
+            <a:fillRect/>
+          </a:stretch>
+        </p:blipFill>
+        <p:spPr>
+          <a:xfrm>
+            <a:off x="0" y="3566160"/>
+            <a:ext cx="3291840" cy="3291840"/>
+          </a:xfrm>
+        </p:spPr>
+      </p:pic>
+      <p:pic>
+        <p:nvPicPr>
+          <p:cNvPr id="5" name="Picture 4" descr="cycle.randompseudograph.txt.png"/>
+          <p:cNvPicPr>
+            <a:picLocks noChangeAspect="1"/>
+          </p:cNvPicPr>
+          <p:nvPr/>
+        </p:nvPicPr>
+        <p:blipFill>
+          <a:blip r:embed="rId3" cstate="print"/>
+          <a:stretch>
+            <a:fillRect/>
+          </a:stretch>
+        </p:blipFill>
+        <p:spPr>
+          <a:xfrm>
+            <a:off x="2926080" y="3566160"/>
+            <a:ext cx="3291840" cy="3291840"/>
+          </a:xfrm>
+          <a:prstGeom prst="rect">
+            <a:avLst/>
+          </a:prstGeom>
+        </p:spPr>
+      </p:pic>
+      <p:pic>
+        <p:nvPicPr>
+          <p:cNvPr id="7" name="Picture 6" descr="cycle.simplelineargraph.txt.png"/>
+          <p:cNvPicPr>
+            <a:picLocks noChangeAspect="1"/>
+          </p:cNvPicPr>
+          <p:nvPr/>
+        </p:nvPicPr>
+        <p:blipFill>
+          <a:blip r:embed="rId4" cstate="print"/>
+          <a:stretch>
+            <a:fillRect/>
+          </a:stretch>
+        </p:blipFill>
+        <p:spPr>
+          <a:xfrm>
+            <a:off x="6019800" y="3566160"/>
+            <a:ext cx="3291840" cy="3291840"/>
+          </a:xfrm>
+          <a:prstGeom prst="rect">
+            <a:avLst/>
+          </a:prstGeom>
+        </p:spPr>
+      </p:pic>
+      <p:grpSp>
+        <p:nvGrpSpPr>
+          <p:cNvPr id="10" name="Group 9"/>
+          <p:cNvGrpSpPr/>
+          <p:nvPr/>
+        </p:nvGrpSpPr>
+        <p:grpSpPr>
+          <a:xfrm>
+            <a:off x="1280160" y="175418"/>
+            <a:ext cx="6583680" cy="3291840"/>
+            <a:chOff x="464662" y="91440"/>
+            <a:chExt cx="6583680" cy="3291840"/>
+          </a:xfrm>
+        </p:grpSpPr>
+        <p:pic>
+          <p:nvPicPr>
+            <p:cNvPr id="6" name="Picture 5" descr="cycle.randomsimplegraph.txt.png"/>
+            <p:cNvPicPr>
+              <a:picLocks noChangeAspect="1"/>
+            </p:cNvPicPr>
+            <p:nvPr/>
+          </p:nvPicPr>
+          <p:blipFill>
+            <a:blip r:embed="rId5" cstate="print"/>
+            <a:stretch>
+              <a:fillRect/>
+            </a:stretch>
+          </p:blipFill>
+          <p:spPr>
+            <a:xfrm>
+              <a:off x="3756502" y="91440"/>
+              <a:ext cx="3291840" cy="3291840"/>
+            </a:xfrm>
+            <a:prstGeom prst="rect">
+              <a:avLst/>
+            </a:prstGeom>
+          </p:spPr>
+        </p:pic>
+        <p:pic>
+          <p:nvPicPr>
+            <p:cNvPr id="8" name="Picture 7" descr="cycle.TestV500E45K.bench.png"/>
+            <p:cNvPicPr>
+              <a:picLocks noChangeAspect="1"/>
+            </p:cNvPicPr>
+            <p:nvPr/>
+          </p:nvPicPr>
+          <p:blipFill>
+            <a:blip r:embed="rId6" cstate="print"/>
+            <a:stretch>
+              <a:fillRect/>
+            </a:stretch>
+          </p:blipFill>
+          <p:spPr>
+            <a:xfrm>
+              <a:off x="464662" y="91440"/>
+              <a:ext cx="3291840" cy="3291840"/>
+            </a:xfrm>
+            <a:prstGeom prst="rect">
+              <a:avLst/>
+            </a:prstGeom>
+          </p:spPr>
+        </p:pic>
+      </p:grpSp>
     </p:spTree>
   </p:cSld>
   <p:clrMapOvr>
@@ -4740,369 +4833,141 @@
           <a:chExt cx="0" cy="0"/>
         </a:xfrm>
       </p:grpSpPr>
-      <p:sp>
-        <p:nvSpPr>
-          <p:cNvPr id="2" name="Title 1"/>
-          <p:cNvSpPr>
-            <a:spLocks noGrp="1"/>
-          </p:cNvSpPr>
-          <p:nvPr>
-            <p:ph type="title"/>
-          </p:nvPr>
-        </p:nvSpPr>
-        <p:spPr/>
-        <p:txBody>
-          <a:bodyPr/>
-          <a:lstStyle/>
-          <a:p>
-            <a:r>
-              <a:rPr lang="en-US" dirty="0" smtClean="0"/>
-              <a:t>Future Work</a:t>
-            </a:r>
-            <a:endParaRPr lang="en-US" dirty="0"/>
-          </a:p>
-        </p:txBody>
-      </p:sp>
-      <p:sp>
-        <p:nvSpPr>
-          <p:cNvPr id="3" name="Content Placeholder 2"/>
-          <p:cNvSpPr>
-            <a:spLocks noGrp="1"/>
-          </p:cNvSpPr>
-          <p:nvPr>
-            <p:ph idx="1"/>
-          </p:nvPr>
-        </p:nvSpPr>
-        <p:spPr/>
-        <p:txBody>
-          <a:bodyPr/>
-          <a:lstStyle/>
-          <a:p>
-            <a:r>
-              <a:rPr lang="en-US" dirty="0" err="1" smtClean="0"/>
-              <a:t>WebGuiDsl</a:t>
-            </a:r>
-            <a:r>
-              <a:rPr lang="en-US" dirty="0" smtClean="0"/>
-              <a:t> for GPL can be generalized for any feature model</a:t>
-            </a:r>
-          </a:p>
-          <a:p>
-            <a:pPr lvl="1"/>
-            <a:r>
-              <a:rPr lang="en-US" dirty="0" smtClean="0"/>
-              <a:t>Only client code would change</a:t>
-            </a:r>
-          </a:p>
-          <a:p>
-            <a:pPr lvl="1"/>
-            <a:r>
-              <a:rPr lang="en-US" dirty="0" smtClean="0"/>
-              <a:t>Currently webguidsl.js has GPL specific code</a:t>
-            </a:r>
-            <a:endParaRPr lang="en-US" dirty="0"/>
-          </a:p>
-        </p:txBody>
-      </p:sp>
-      <p:sp>
-        <p:nvSpPr>
-          <p:cNvPr id="5" name="Rounded Rectangle 4"/>
-          <p:cNvSpPr/>
+      <p:pic>
+        <p:nvPicPr>
+          <p:cNvPr id="10" name="Picture 9" descr="connected.randommultigraph.txt.png"/>
+          <p:cNvPicPr>
+            <a:picLocks noChangeAspect="1"/>
+          </p:cNvPicPr>
           <p:nvPr/>
-        </p:nvSpPr>
+        </p:nvPicPr>
+        <p:blipFill>
+          <a:blip r:embed="rId2" cstate="print"/>
+          <a:stretch>
+            <a:fillRect/>
+          </a:stretch>
+        </p:blipFill>
         <p:spPr>
           <a:xfrm>
-            <a:off x="3124200" y="4322802"/>
-            <a:ext cx="1676400" cy="914400"/>
-          </a:xfrm>
-          <a:prstGeom prst="roundRect">
-            <a:avLst>
-              <a:gd name="adj" fmla="val 8875"/>
-            </a:avLst>
-          </a:prstGeom>
-          <a:ln>
-            <a:solidFill>
-              <a:schemeClr val="accent1">
-                <a:lumMod val="75000"/>
-              </a:schemeClr>
-            </a:solidFill>
-          </a:ln>
-        </p:spPr>
-        <p:style>
-          <a:lnRef idx="2">
-            <a:schemeClr val="accent6"/>
-          </a:lnRef>
-          <a:fillRef idx="1">
-            <a:schemeClr val="lt1"/>
-          </a:fillRef>
-          <a:effectRef idx="0">
-            <a:schemeClr val="accent6"/>
-          </a:effectRef>
-          <a:fontRef idx="minor">
-            <a:schemeClr val="dk1"/>
-          </a:fontRef>
-        </p:style>
-        <p:txBody>
-          <a:bodyPr rtlCol="0" anchor="ctr"/>
-          <a:lstStyle/>
-          <a:p>
-            <a:pPr algn="ctr"/>
-            <a:endParaRPr lang="en-US"/>
-          </a:p>
-        </p:txBody>
-      </p:sp>
-      <p:sp>
-        <p:nvSpPr>
-          <p:cNvPr id="6" name="TextBox 5"/>
-          <p:cNvSpPr txBox="1"/>
-          <p:nvPr/>
-        </p:nvSpPr>
-        <p:spPr>
-          <a:xfrm>
-            <a:off x="3124200" y="4322802"/>
-            <a:ext cx="1676400" cy="923330"/>
+            <a:off x="0" y="3566160"/>
+            <a:ext cx="3291840" cy="3291840"/>
           </a:xfrm>
           <a:prstGeom prst="rect">
             <a:avLst/>
           </a:prstGeom>
-          <a:noFill/>
         </p:spPr>
-        <p:txBody>
-          <a:bodyPr wrap="square" rtlCol="0">
-            <a:spAutoFit/>
-          </a:bodyPr>
-          <a:lstStyle/>
-          <a:p>
-            <a:pPr algn="ctr"/>
-            <a:r>
-              <a:rPr lang="en-US" dirty="0" smtClean="0"/>
-              <a:t>Currently</a:t>
-            </a:r>
-          </a:p>
-          <a:p>
-            <a:pPr algn="ctr"/>
-            <a:r>
-              <a:rPr lang="en-US" dirty="0" smtClean="0"/>
-              <a:t>Non-Existent </a:t>
-            </a:r>
-          </a:p>
-          <a:p>
-            <a:pPr algn="ctr"/>
-            <a:r>
-              <a:rPr lang="en-US" dirty="0" smtClean="0"/>
-              <a:t>Tool</a:t>
-            </a:r>
-            <a:endParaRPr lang="en-US" dirty="0"/>
-          </a:p>
-        </p:txBody>
-      </p:sp>
-      <p:sp>
-        <p:nvSpPr>
-          <p:cNvPr id="7" name="TextBox 6"/>
-          <p:cNvSpPr txBox="1"/>
+      </p:pic>
+      <p:pic>
+        <p:nvPicPr>
+          <p:cNvPr id="11" name="Picture 10" descr="connected.randompseudograph.txt.png"/>
+          <p:cNvPicPr>
+            <a:picLocks noChangeAspect="1"/>
+          </p:cNvPicPr>
           <p:nvPr/>
-        </p:nvSpPr>
+        </p:nvPicPr>
+        <p:blipFill>
+          <a:blip r:embed="rId3" cstate="print"/>
+          <a:stretch>
+            <a:fillRect/>
+          </a:stretch>
+        </p:blipFill>
         <p:spPr>
           <a:xfrm>
-            <a:off x="1173145" y="4601389"/>
-            <a:ext cx="1371600" cy="369332"/>
+            <a:off x="3048000" y="3566160"/>
+            <a:ext cx="3291840" cy="3291840"/>
           </a:xfrm>
           <a:prstGeom prst="rect">
             <a:avLst/>
           </a:prstGeom>
-          <a:noFill/>
         </p:spPr>
-        <p:txBody>
-          <a:bodyPr wrap="square" rtlCol="0">
-            <a:spAutoFit/>
-          </a:bodyPr>
-          <a:lstStyle/>
-          <a:p>
-            <a:r>
-              <a:rPr lang="en-US" dirty="0" err="1" smtClean="0"/>
-              <a:t>mymodel.m</a:t>
-            </a:r>
-            <a:endParaRPr lang="en-US" dirty="0"/>
-          </a:p>
-        </p:txBody>
-      </p:sp>
-      <p:cxnSp>
-        <p:nvCxnSpPr>
-          <p:cNvPr id="9" name="Straight Arrow Connector 8"/>
-          <p:cNvCxnSpPr>
-            <a:stCxn id="7" idx="3"/>
-            <a:endCxn id="6" idx="1"/>
-          </p:cNvCxnSpPr>
+      </p:pic>
+      <p:pic>
+        <p:nvPicPr>
+          <p:cNvPr id="13" name="Picture 12" descr="connected.simplelineargraph.txt.png"/>
+          <p:cNvPicPr>
+            <a:picLocks noChangeAspect="1"/>
+          </p:cNvPicPr>
           <p:nvPr/>
-        </p:nvCxnSpPr>
-        <p:spPr>
-          <a:xfrm flipV="1">
-            <a:off x="2544745" y="4784467"/>
-            <a:ext cx="579455" cy="1588"/>
-          </a:xfrm>
-          <a:prstGeom prst="straightConnector1">
-            <a:avLst/>
-          </a:prstGeom>
-          <a:ln>
-            <a:solidFill>
-              <a:schemeClr val="tx1"/>
-            </a:solidFill>
-            <a:tailEnd type="arrow"/>
-          </a:ln>
-        </p:spPr>
-        <p:style>
-          <a:lnRef idx="1">
-            <a:schemeClr val="accent1"/>
-          </a:lnRef>
-          <a:fillRef idx="0">
-            <a:schemeClr val="accent1"/>
-          </a:fillRef>
-          <a:effectRef idx="0">
-            <a:schemeClr val="accent1"/>
-          </a:effectRef>
-          <a:fontRef idx="minor">
-            <a:schemeClr val="tx1"/>
-          </a:fontRef>
-        </p:style>
-      </p:cxnSp>
-      <p:sp>
-        <p:nvSpPr>
-          <p:cNvPr id="11" name="TextBox 10"/>
-          <p:cNvSpPr txBox="1"/>
-          <p:nvPr/>
-        </p:nvSpPr>
+        </p:nvPicPr>
+        <p:blipFill>
+          <a:blip r:embed="rId4" cstate="print"/>
+          <a:stretch>
+            <a:fillRect/>
+          </a:stretch>
+        </p:blipFill>
         <p:spPr>
           <a:xfrm>
-            <a:off x="5592745" y="4322802"/>
-            <a:ext cx="1600200" cy="369332"/>
+            <a:off x="6096000" y="3566160"/>
+            <a:ext cx="3291840" cy="3291840"/>
           </a:xfrm>
           <a:prstGeom prst="rect">
             <a:avLst/>
           </a:prstGeom>
-          <a:noFill/>
         </p:spPr>
-        <p:txBody>
-          <a:bodyPr wrap="square" rtlCol="0">
-            <a:spAutoFit/>
-          </a:bodyPr>
-          <a:lstStyle/>
-          <a:p>
-            <a:r>
-              <a:rPr lang="en-US" dirty="0" smtClean="0"/>
-              <a:t>mymodel.html</a:t>
-            </a:r>
-            <a:endParaRPr lang="en-US" dirty="0"/>
-          </a:p>
-        </p:txBody>
-      </p:sp>
-      <p:sp>
-        <p:nvSpPr>
-          <p:cNvPr id="12" name="TextBox 11"/>
-          <p:cNvSpPr txBox="1"/>
+      </p:pic>
+      <p:grpSp>
+        <p:nvGrpSpPr>
+          <p:cNvPr id="15" name="Group 14"/>
+          <p:cNvGrpSpPr/>
           <p:nvPr/>
-        </p:nvSpPr>
-        <p:spPr>
+        </p:nvGrpSpPr>
+        <p:grpSpPr>
           <a:xfrm>
-            <a:off x="5592745" y="4876800"/>
-            <a:ext cx="2286000" cy="369332"/>
+            <a:off x="1280160" y="274320"/>
+            <a:ext cx="6583680" cy="3291840"/>
+            <a:chOff x="0" y="0"/>
+            <a:chExt cx="6583680" cy="3291840"/>
           </a:xfrm>
-          <a:prstGeom prst="rect">
-            <a:avLst/>
-          </a:prstGeom>
-          <a:noFill/>
-        </p:spPr>
-        <p:txBody>
-          <a:bodyPr wrap="square" rtlCol="0">
-            <a:spAutoFit/>
-          </a:bodyPr>
-          <a:lstStyle/>
-          <a:p>
-            <a:r>
-              <a:rPr lang="en-US" dirty="0" smtClean="0"/>
-              <a:t>validatemymodel.js</a:t>
-            </a:r>
-            <a:endParaRPr lang="en-US" dirty="0"/>
-          </a:p>
-        </p:txBody>
-      </p:sp>
-      <p:cxnSp>
-        <p:nvCxnSpPr>
-          <p:cNvPr id="24" name="Straight Arrow Connector 23"/>
-          <p:cNvCxnSpPr>
-            <a:stCxn id="6" idx="3"/>
-            <a:endCxn id="11" idx="1"/>
-          </p:cNvCxnSpPr>
-          <p:nvPr/>
-        </p:nvCxnSpPr>
-        <p:spPr>
-          <a:xfrm flipV="1">
-            <a:off x="4800600" y="4507468"/>
-            <a:ext cx="792145" cy="276999"/>
-          </a:xfrm>
-          <a:prstGeom prst="straightConnector1">
-            <a:avLst/>
-          </a:prstGeom>
-          <a:ln>
-            <a:solidFill>
-              <a:schemeClr val="tx1"/>
-            </a:solidFill>
-            <a:tailEnd type="arrow"/>
-          </a:ln>
-        </p:spPr>
-        <p:style>
-          <a:lnRef idx="1">
-            <a:schemeClr val="accent1"/>
-          </a:lnRef>
-          <a:fillRef idx="0">
-            <a:schemeClr val="accent1"/>
-          </a:fillRef>
-          <a:effectRef idx="0">
-            <a:schemeClr val="accent1"/>
-          </a:effectRef>
-          <a:fontRef idx="minor">
-            <a:schemeClr val="tx1"/>
-          </a:fontRef>
-        </p:style>
-      </p:cxnSp>
-      <p:cxnSp>
-        <p:nvCxnSpPr>
-          <p:cNvPr id="26" name="Straight Arrow Connector 25"/>
-          <p:cNvCxnSpPr>
-            <a:stCxn id="6" idx="3"/>
-            <a:endCxn id="12" idx="1"/>
-          </p:cNvCxnSpPr>
-          <p:nvPr/>
-        </p:nvCxnSpPr>
-        <p:spPr>
-          <a:xfrm>
-            <a:off x="4800600" y="4784467"/>
-            <a:ext cx="792145" cy="276999"/>
-          </a:xfrm>
-          <a:prstGeom prst="straightConnector1">
-            <a:avLst/>
-          </a:prstGeom>
-          <a:ln>
-            <a:solidFill>
-              <a:schemeClr val="tx1"/>
-            </a:solidFill>
-            <a:tailEnd type="arrow"/>
-          </a:ln>
-        </p:spPr>
-        <p:style>
-          <a:lnRef idx="1">
-            <a:schemeClr val="accent1"/>
-          </a:lnRef>
-          <a:fillRef idx="0">
-            <a:schemeClr val="accent1"/>
-          </a:fillRef>
-          <a:effectRef idx="0">
-            <a:schemeClr val="accent1"/>
-          </a:effectRef>
-          <a:fontRef idx="minor">
-            <a:schemeClr val="tx1"/>
-          </a:fontRef>
-        </p:style>
-      </p:cxnSp>
+        </p:grpSpPr>
+        <p:pic>
+          <p:nvPicPr>
+            <p:cNvPr id="12" name="Picture 11" descr="connected.randomsimplegraph.txt.png"/>
+            <p:cNvPicPr>
+              <a:picLocks noChangeAspect="1"/>
+            </p:cNvPicPr>
+            <p:nvPr/>
+          </p:nvPicPr>
+          <p:blipFill>
+            <a:blip r:embed="rId5" cstate="print"/>
+            <a:stretch>
+              <a:fillRect/>
+            </a:stretch>
+          </p:blipFill>
+          <p:spPr>
+            <a:xfrm>
+              <a:off x="3291840" y="0"/>
+              <a:ext cx="3291840" cy="3291840"/>
+            </a:xfrm>
+            <a:prstGeom prst="rect">
+              <a:avLst/>
+            </a:prstGeom>
+          </p:spPr>
+        </p:pic>
+        <p:pic>
+          <p:nvPicPr>
+            <p:cNvPr id="14" name="Picture 13" descr="connected.TestV500E45K.bench.png"/>
+            <p:cNvPicPr>
+              <a:picLocks noChangeAspect="1"/>
+            </p:cNvPicPr>
+            <p:nvPr/>
+          </p:nvPicPr>
+          <p:blipFill>
+            <a:blip r:embed="rId6" cstate="print"/>
+            <a:stretch>
+              <a:fillRect/>
+            </a:stretch>
+          </p:blipFill>
+          <p:spPr>
+            <a:xfrm>
+              <a:off x="0" y="0"/>
+              <a:ext cx="3291840" cy="3291840"/>
+            </a:xfrm>
+            <a:prstGeom prst="rect">
+              <a:avLst/>
+            </a:prstGeom>
+          </p:spPr>
+        </p:pic>
+      </p:grpSp>
     </p:spTree>
   </p:cSld>
   <p:clrMapOvr>
@@ -5111,273 +4976,1041 @@
   <p:timing>
     <p:tnLst>
       <p:par>
-        <p:cTn id="1" dur="indefinite" restart="never" nodeType="tmRoot">
-          <p:childTnLst>
-            <p:seq concurrent="1" nextAc="seek">
-              <p:cTn id="2" dur="indefinite" nodeType="mainSeq">
-                <p:childTnLst>
-                  <p:par>
-                    <p:cTn id="3" fill="hold">
-                      <p:stCondLst>
-                        <p:cond delay="indefinite"/>
-                      </p:stCondLst>
-                      <p:childTnLst>
-                        <p:par>
-                          <p:cTn id="4" fill="hold">
-                            <p:stCondLst>
-                              <p:cond delay="0"/>
-                            </p:stCondLst>
-                            <p:childTnLst>
-                              <p:par>
-                                <p:cTn id="5" presetID="1" presetClass="entr" presetSubtype="0" fill="hold" grpId="0" nodeType="clickEffect">
-                                  <p:stCondLst>
-                                    <p:cond delay="0"/>
-                                  </p:stCondLst>
-                                  <p:childTnLst>
-                                    <p:set>
-                                      <p:cBhvr>
-                                        <p:cTn id="6" dur="1" fill="hold">
-                                          <p:stCondLst>
-                                            <p:cond delay="0"/>
-                                          </p:stCondLst>
-                                        </p:cTn>
-                                        <p:tgtEl>
-                                          <p:spTgt spid="5"/>
-                                        </p:tgtEl>
-                                        <p:attrNameLst>
-                                          <p:attrName>style.visibility</p:attrName>
-                                        </p:attrNameLst>
-                                      </p:cBhvr>
-                                      <p:to>
-                                        <p:strVal val="visible"/>
-                                      </p:to>
-                                    </p:set>
-                                  </p:childTnLst>
-                                </p:cTn>
-                              </p:par>
-                              <p:par>
-                                <p:cTn id="7" presetID="1" presetClass="entr" presetSubtype="0" fill="hold" grpId="0" nodeType="withEffect">
-                                  <p:stCondLst>
-                                    <p:cond delay="0"/>
-                                  </p:stCondLst>
-                                  <p:childTnLst>
-                                    <p:set>
-                                      <p:cBhvr>
-                                        <p:cTn id="8" dur="1" fill="hold">
-                                          <p:stCondLst>
-                                            <p:cond delay="0"/>
-                                          </p:stCondLst>
-                                        </p:cTn>
-                                        <p:tgtEl>
-                                          <p:spTgt spid="6"/>
-                                        </p:tgtEl>
-                                        <p:attrNameLst>
-                                          <p:attrName>style.visibility</p:attrName>
-                                        </p:attrNameLst>
-                                      </p:cBhvr>
-                                      <p:to>
-                                        <p:strVal val="visible"/>
-                                      </p:to>
-                                    </p:set>
-                                  </p:childTnLst>
-                                </p:cTn>
-                              </p:par>
-                              <p:par>
-                                <p:cTn id="9" presetID="1" presetClass="entr" presetSubtype="0" fill="hold" grpId="0" nodeType="withEffect">
-                                  <p:stCondLst>
-                                    <p:cond delay="0"/>
-                                  </p:stCondLst>
-                                  <p:childTnLst>
-                                    <p:set>
-                                      <p:cBhvr>
-                                        <p:cTn id="10" dur="1" fill="hold">
-                                          <p:stCondLst>
-                                            <p:cond delay="0"/>
-                                          </p:stCondLst>
-                                        </p:cTn>
-                                        <p:tgtEl>
-                                          <p:spTgt spid="7"/>
-                                        </p:tgtEl>
-                                        <p:attrNameLst>
-                                          <p:attrName>style.visibility</p:attrName>
-                                        </p:attrNameLst>
-                                      </p:cBhvr>
-                                      <p:to>
-                                        <p:strVal val="visible"/>
-                                      </p:to>
-                                    </p:set>
-                                  </p:childTnLst>
-                                </p:cTn>
-                              </p:par>
-                              <p:par>
-                                <p:cTn id="11" presetID="1" presetClass="entr" presetSubtype="0" fill="hold" nodeType="withEffect">
-                                  <p:stCondLst>
-                                    <p:cond delay="0"/>
-                                  </p:stCondLst>
-                                  <p:childTnLst>
-                                    <p:set>
-                                      <p:cBhvr>
-                                        <p:cTn id="12" dur="1" fill="hold">
-                                          <p:stCondLst>
-                                            <p:cond delay="0"/>
-                                          </p:stCondLst>
-                                        </p:cTn>
-                                        <p:tgtEl>
-                                          <p:spTgt spid="9"/>
-                                        </p:tgtEl>
-                                        <p:attrNameLst>
-                                          <p:attrName>style.visibility</p:attrName>
-                                        </p:attrNameLst>
-                                      </p:cBhvr>
-                                      <p:to>
-                                        <p:strVal val="visible"/>
-                                      </p:to>
-                                    </p:set>
-                                  </p:childTnLst>
-                                </p:cTn>
-                              </p:par>
-                              <p:par>
-                                <p:cTn id="13" presetID="1" presetClass="entr" presetSubtype="0" fill="hold" grpId="0" nodeType="withEffect">
-                                  <p:stCondLst>
-                                    <p:cond delay="0"/>
-                                  </p:stCondLst>
-                                  <p:childTnLst>
-                                    <p:set>
-                                      <p:cBhvr>
-                                        <p:cTn id="14" dur="1" fill="hold">
-                                          <p:stCondLst>
-                                            <p:cond delay="0"/>
-                                          </p:stCondLst>
-                                        </p:cTn>
-                                        <p:tgtEl>
-                                          <p:spTgt spid="11"/>
-                                        </p:tgtEl>
-                                        <p:attrNameLst>
-                                          <p:attrName>style.visibility</p:attrName>
-                                        </p:attrNameLst>
-                                      </p:cBhvr>
-                                      <p:to>
-                                        <p:strVal val="visible"/>
-                                      </p:to>
-                                    </p:set>
-                                  </p:childTnLst>
-                                </p:cTn>
-                              </p:par>
-                              <p:par>
-                                <p:cTn id="15" presetID="1" presetClass="entr" presetSubtype="0" fill="hold" grpId="0" nodeType="withEffect">
-                                  <p:stCondLst>
-                                    <p:cond delay="0"/>
-                                  </p:stCondLst>
-                                  <p:childTnLst>
-                                    <p:set>
-                                      <p:cBhvr>
-                                        <p:cTn id="16" dur="1" fill="hold">
-                                          <p:stCondLst>
-                                            <p:cond delay="0"/>
-                                          </p:stCondLst>
-                                        </p:cTn>
-                                        <p:tgtEl>
-                                          <p:spTgt spid="12"/>
-                                        </p:tgtEl>
-                                        <p:attrNameLst>
-                                          <p:attrName>style.visibility</p:attrName>
-                                        </p:attrNameLst>
-                                      </p:cBhvr>
-                                      <p:to>
-                                        <p:strVal val="visible"/>
-                                      </p:to>
-                                    </p:set>
-                                  </p:childTnLst>
-                                </p:cTn>
-                              </p:par>
-                              <p:par>
-                                <p:cTn id="17" presetID="1" presetClass="entr" presetSubtype="0" fill="hold" nodeType="withEffect">
-                                  <p:stCondLst>
-                                    <p:cond delay="0"/>
-                                  </p:stCondLst>
-                                  <p:childTnLst>
-                                    <p:set>
-                                      <p:cBhvr>
-                                        <p:cTn id="18" dur="1" fill="hold">
-                                          <p:stCondLst>
-                                            <p:cond delay="0"/>
-                                          </p:stCondLst>
-                                        </p:cTn>
-                                        <p:tgtEl>
-                                          <p:spTgt spid="24"/>
-                                        </p:tgtEl>
-                                        <p:attrNameLst>
-                                          <p:attrName>style.visibility</p:attrName>
-                                        </p:attrNameLst>
-                                      </p:cBhvr>
-                                      <p:to>
-                                        <p:strVal val="visible"/>
-                                      </p:to>
-                                    </p:set>
-                                  </p:childTnLst>
-                                </p:cTn>
-                              </p:par>
-                              <p:par>
-                                <p:cTn id="19" presetID="1" presetClass="entr" presetSubtype="0" fill="hold" nodeType="withEffect">
-                                  <p:stCondLst>
-                                    <p:cond delay="0"/>
-                                  </p:stCondLst>
-                                  <p:childTnLst>
-                                    <p:set>
-                                      <p:cBhvr>
-                                        <p:cTn id="20" dur="1" fill="hold">
-                                          <p:stCondLst>
-                                            <p:cond delay="0"/>
-                                          </p:stCondLst>
-                                        </p:cTn>
-                                        <p:tgtEl>
-                                          <p:spTgt spid="26"/>
-                                        </p:tgtEl>
-                                        <p:attrNameLst>
-                                          <p:attrName>style.visibility</p:attrName>
-                                        </p:attrNameLst>
-                                      </p:cBhvr>
-                                      <p:to>
-                                        <p:strVal val="visible"/>
-                                      </p:to>
-                                    </p:set>
-                                  </p:childTnLst>
-                                </p:cTn>
-                              </p:par>
-                            </p:childTnLst>
-                          </p:cTn>
-                        </p:par>
-                      </p:childTnLst>
-                    </p:cTn>
-                  </p:par>
-                </p:childTnLst>
-              </p:cTn>
-              <p:prevCondLst>
-                <p:cond evt="onPrev" delay="0">
-                  <p:tgtEl>
-                    <p:sldTgt/>
-                  </p:tgtEl>
-                </p:cond>
-              </p:prevCondLst>
-              <p:nextCondLst>
-                <p:cond evt="onNext" delay="0">
-                  <p:tgtEl>
-                    <p:sldTgt/>
-                  </p:tgtEl>
-                </p:cond>
-              </p:nextCondLst>
-            </p:seq>
-          </p:childTnLst>
-        </p:cTn>
+        <p:cTn id="1" dur="indefinite" restart="never" nodeType="tmRoot"/>
       </p:par>
     </p:tnLst>
-    <p:bldLst>
-      <p:bldP spid="5" grpId="0" animBg="1"/>
-      <p:bldP spid="6" grpId="0"/>
-      <p:bldP spid="7" grpId="0"/>
-      <p:bldP spid="11" grpId="0"/>
-      <p:bldP spid="12" grpId="0"/>
-    </p:bldLst>
+  </p:timing>
+</p:sld>
+</file>
+
+<file path=ppt/slides/slide12.xml><?xml version="1.0" encoding="utf-8"?>
+<p:sld xmlns:a="http://schemas.openxmlformats.org/drawingml/2006/main" xmlns:r="http://schemas.openxmlformats.org/officeDocument/2006/relationships" xmlns:p="http://schemas.openxmlformats.org/presentationml/2006/main">
+  <p:cSld>
+    <p:spTree>
+      <p:nvGrpSpPr>
+        <p:cNvPr id="1" name=""/>
+        <p:cNvGrpSpPr/>
+        <p:nvPr/>
+      </p:nvGrpSpPr>
+      <p:grpSpPr>
+        <a:xfrm>
+          <a:off x="0" y="0"/>
+          <a:ext cx="0" cy="0"/>
+          <a:chOff x="0" y="0"/>
+          <a:chExt cx="0" cy="0"/>
+        </a:xfrm>
+      </p:grpSpPr>
+      <p:pic>
+        <p:nvPicPr>
+          <p:cNvPr id="11" name="Picture 10" descr="mstPrim.randommultigraph.txt.png"/>
+          <p:cNvPicPr>
+            <a:picLocks noChangeAspect="1"/>
+          </p:cNvPicPr>
+          <p:nvPr/>
+        </p:nvPicPr>
+        <p:blipFill>
+          <a:blip r:embed="rId2" cstate="print"/>
+          <a:stretch>
+            <a:fillRect/>
+          </a:stretch>
+        </p:blipFill>
+        <p:spPr>
+          <a:xfrm>
+            <a:off x="0" y="3566160"/>
+            <a:ext cx="3291840" cy="3291840"/>
+          </a:xfrm>
+          <a:prstGeom prst="rect">
+            <a:avLst/>
+          </a:prstGeom>
+        </p:spPr>
+      </p:pic>
+      <p:pic>
+        <p:nvPicPr>
+          <p:cNvPr id="12" name="Picture 11" descr="mstPrim.randompseudograph.txt.png"/>
+          <p:cNvPicPr>
+            <a:picLocks noChangeAspect="1"/>
+          </p:cNvPicPr>
+          <p:nvPr/>
+        </p:nvPicPr>
+        <p:blipFill>
+          <a:blip r:embed="rId3" cstate="print"/>
+          <a:stretch>
+            <a:fillRect/>
+          </a:stretch>
+        </p:blipFill>
+        <p:spPr>
+          <a:xfrm>
+            <a:off x="3048000" y="3566160"/>
+            <a:ext cx="3291840" cy="3291840"/>
+          </a:xfrm>
+          <a:prstGeom prst="rect">
+            <a:avLst/>
+          </a:prstGeom>
+        </p:spPr>
+      </p:pic>
+      <p:pic>
+        <p:nvPicPr>
+          <p:cNvPr id="14" name="Picture 13" descr="mstPrim.simplelineargraph.txt.png"/>
+          <p:cNvPicPr>
+            <a:picLocks noChangeAspect="1"/>
+          </p:cNvPicPr>
+          <p:nvPr/>
+        </p:nvPicPr>
+        <p:blipFill>
+          <a:blip r:embed="rId4" cstate="print"/>
+          <a:stretch>
+            <a:fillRect/>
+          </a:stretch>
+        </p:blipFill>
+        <p:spPr>
+          <a:xfrm>
+            <a:off x="6096000" y="3566160"/>
+            <a:ext cx="3291840" cy="3291840"/>
+          </a:xfrm>
+          <a:prstGeom prst="rect">
+            <a:avLst/>
+          </a:prstGeom>
+        </p:spPr>
+      </p:pic>
+      <p:grpSp>
+        <p:nvGrpSpPr>
+          <p:cNvPr id="16" name="Group 15"/>
+          <p:cNvGrpSpPr/>
+          <p:nvPr/>
+        </p:nvGrpSpPr>
+        <p:grpSpPr>
+          <a:xfrm>
+            <a:off x="1280160" y="124320"/>
+            <a:ext cx="6583680" cy="3291840"/>
+            <a:chOff x="609600" y="124320"/>
+            <a:chExt cx="6583680" cy="3291840"/>
+          </a:xfrm>
+        </p:grpSpPr>
+        <p:pic>
+          <p:nvPicPr>
+            <p:cNvPr id="13" name="Picture 12" descr="mstPrim.randomsimplegraph.txt.png"/>
+            <p:cNvPicPr>
+              <a:picLocks noChangeAspect="1"/>
+            </p:cNvPicPr>
+            <p:nvPr/>
+          </p:nvPicPr>
+          <p:blipFill>
+            <a:blip r:embed="rId5" cstate="print"/>
+            <a:stretch>
+              <a:fillRect/>
+            </a:stretch>
+          </p:blipFill>
+          <p:spPr>
+            <a:xfrm>
+              <a:off x="3901440" y="124320"/>
+              <a:ext cx="3291840" cy="3291840"/>
+            </a:xfrm>
+            <a:prstGeom prst="rect">
+              <a:avLst/>
+            </a:prstGeom>
+          </p:spPr>
+        </p:pic>
+        <p:pic>
+          <p:nvPicPr>
+            <p:cNvPr id="15" name="Picture 14" descr="mstPrim.TestV500E45K.bench.png"/>
+            <p:cNvPicPr>
+              <a:picLocks noChangeAspect="1"/>
+            </p:cNvPicPr>
+            <p:nvPr/>
+          </p:nvPicPr>
+          <p:blipFill>
+            <a:blip r:embed="rId6" cstate="print"/>
+            <a:stretch>
+              <a:fillRect/>
+            </a:stretch>
+          </p:blipFill>
+          <p:spPr>
+            <a:xfrm>
+              <a:off x="609600" y="124320"/>
+              <a:ext cx="3291840" cy="3291840"/>
+            </a:xfrm>
+            <a:prstGeom prst="rect">
+              <a:avLst/>
+            </a:prstGeom>
+          </p:spPr>
+        </p:pic>
+      </p:grpSp>
+    </p:spTree>
+  </p:cSld>
+  <p:clrMapOvr>
+    <a:masterClrMapping/>
+  </p:clrMapOvr>
+  <p:timing>
+    <p:tnLst>
+      <p:par>
+        <p:cTn id="1" dur="indefinite" restart="never" nodeType="tmRoot"/>
+      </p:par>
+    </p:tnLst>
+  </p:timing>
+</p:sld>
+</file>
+
+<file path=ppt/slides/slide13.xml><?xml version="1.0" encoding="utf-8"?>
+<p:sld xmlns:a="http://schemas.openxmlformats.org/drawingml/2006/main" xmlns:r="http://schemas.openxmlformats.org/officeDocument/2006/relationships" xmlns:p="http://schemas.openxmlformats.org/presentationml/2006/main">
+  <p:cSld>
+    <p:spTree>
+      <p:nvGrpSpPr>
+        <p:cNvPr id="1" name=""/>
+        <p:cNvGrpSpPr/>
+        <p:nvPr/>
+      </p:nvGrpSpPr>
+      <p:grpSpPr>
+        <a:xfrm>
+          <a:off x="0" y="0"/>
+          <a:ext cx="0" cy="0"/>
+          <a:chOff x="0" y="0"/>
+          <a:chExt cx="0" cy="0"/>
+        </a:xfrm>
+      </p:grpSpPr>
+      <p:pic>
+        <p:nvPicPr>
+          <p:cNvPr id="10" name="Picture 9" descr="mstKruskal.randommultigraph.txt.png"/>
+          <p:cNvPicPr>
+            <a:picLocks noChangeAspect="1"/>
+          </p:cNvPicPr>
+          <p:nvPr/>
+        </p:nvPicPr>
+        <p:blipFill>
+          <a:blip r:embed="rId2" cstate="print"/>
+          <a:stretch>
+            <a:fillRect/>
+          </a:stretch>
+        </p:blipFill>
+        <p:spPr>
+          <a:xfrm>
+            <a:off x="0" y="3566160"/>
+            <a:ext cx="3291840" cy="3291840"/>
+          </a:xfrm>
+          <a:prstGeom prst="rect">
+            <a:avLst/>
+          </a:prstGeom>
+        </p:spPr>
+      </p:pic>
+      <p:pic>
+        <p:nvPicPr>
+          <p:cNvPr id="11" name="Picture 10" descr="mstKruskal.randompseudograph.txt.png"/>
+          <p:cNvPicPr>
+            <a:picLocks noChangeAspect="1"/>
+          </p:cNvPicPr>
+          <p:nvPr/>
+        </p:nvPicPr>
+        <p:blipFill>
+          <a:blip r:embed="rId3" cstate="print"/>
+          <a:stretch>
+            <a:fillRect/>
+          </a:stretch>
+        </p:blipFill>
+        <p:spPr>
+          <a:xfrm>
+            <a:off x="3124200" y="3566160"/>
+            <a:ext cx="3291840" cy="3291840"/>
+          </a:xfrm>
+          <a:prstGeom prst="rect">
+            <a:avLst/>
+          </a:prstGeom>
+        </p:spPr>
+      </p:pic>
+      <p:pic>
+        <p:nvPicPr>
+          <p:cNvPr id="13" name="Picture 12" descr="mstKruskal.simplelineargraph.txt.png"/>
+          <p:cNvPicPr>
+            <a:picLocks noChangeAspect="1"/>
+          </p:cNvPicPr>
+          <p:nvPr/>
+        </p:nvPicPr>
+        <p:blipFill>
+          <a:blip r:embed="rId4" cstate="print"/>
+          <a:stretch>
+            <a:fillRect/>
+          </a:stretch>
+        </p:blipFill>
+        <p:spPr>
+          <a:xfrm>
+            <a:off x="6217920" y="3566160"/>
+            <a:ext cx="3291840" cy="3291840"/>
+          </a:xfrm>
+          <a:prstGeom prst="rect">
+            <a:avLst/>
+          </a:prstGeom>
+        </p:spPr>
+      </p:pic>
+      <p:grpSp>
+        <p:nvGrpSpPr>
+          <p:cNvPr id="15" name="Group 14"/>
+          <p:cNvGrpSpPr/>
+          <p:nvPr/>
+        </p:nvGrpSpPr>
+        <p:grpSpPr>
+          <a:xfrm>
+            <a:off x="1280160" y="152400"/>
+            <a:ext cx="6583680" cy="3291840"/>
+            <a:chOff x="0" y="152400"/>
+            <a:chExt cx="6583680" cy="3291840"/>
+          </a:xfrm>
+        </p:grpSpPr>
+        <p:pic>
+          <p:nvPicPr>
+            <p:cNvPr id="12" name="Picture 11" descr="mstKruskal.randomsimplegraph.txt.png"/>
+            <p:cNvPicPr>
+              <a:picLocks noChangeAspect="1"/>
+            </p:cNvPicPr>
+            <p:nvPr/>
+          </p:nvPicPr>
+          <p:blipFill>
+            <a:blip r:embed="rId5" cstate="print"/>
+            <a:stretch>
+              <a:fillRect/>
+            </a:stretch>
+          </p:blipFill>
+          <p:spPr>
+            <a:xfrm>
+              <a:off x="3291840" y="152400"/>
+              <a:ext cx="3291840" cy="3291840"/>
+            </a:xfrm>
+            <a:prstGeom prst="rect">
+              <a:avLst/>
+            </a:prstGeom>
+          </p:spPr>
+        </p:pic>
+        <p:pic>
+          <p:nvPicPr>
+            <p:cNvPr id="14" name="Picture 13" descr="mstKruskal.TestV500E45K.bench.png"/>
+            <p:cNvPicPr>
+              <a:picLocks noChangeAspect="1"/>
+            </p:cNvPicPr>
+            <p:nvPr/>
+          </p:nvPicPr>
+          <p:blipFill>
+            <a:blip r:embed="rId6" cstate="print"/>
+            <a:stretch>
+              <a:fillRect/>
+            </a:stretch>
+          </p:blipFill>
+          <p:spPr>
+            <a:xfrm>
+              <a:off x="0" y="152400"/>
+              <a:ext cx="3291840" cy="3291840"/>
+            </a:xfrm>
+            <a:prstGeom prst="rect">
+              <a:avLst/>
+            </a:prstGeom>
+          </p:spPr>
+        </p:pic>
+      </p:grpSp>
+    </p:spTree>
+  </p:cSld>
+  <p:clrMapOvr>
+    <a:masterClrMapping/>
+  </p:clrMapOvr>
+  <p:timing>
+    <p:tnLst>
+      <p:par>
+        <p:cTn id="1" dur="indefinite" restart="never" nodeType="tmRoot"/>
+      </p:par>
+    </p:tnLst>
+  </p:timing>
+</p:sld>
+</file>
+
+<file path=ppt/slides/slide14.xml><?xml version="1.0" encoding="utf-8"?>
+<p:sld xmlns:a="http://schemas.openxmlformats.org/drawingml/2006/main" xmlns:r="http://schemas.openxmlformats.org/officeDocument/2006/relationships" xmlns:p="http://schemas.openxmlformats.org/presentationml/2006/main">
+  <p:cSld>
+    <p:spTree>
+      <p:nvGrpSpPr>
+        <p:cNvPr id="1" name=""/>
+        <p:cNvGrpSpPr/>
+        <p:nvPr/>
+      </p:nvGrpSpPr>
+      <p:grpSpPr>
+        <a:xfrm>
+          <a:off x="0" y="0"/>
+          <a:ext cx="0" cy="0"/>
+          <a:chOff x="0" y="0"/>
+          <a:chExt cx="0" cy="0"/>
+        </a:xfrm>
+      </p:grpSpPr>
+      <p:grpSp>
+        <p:nvGrpSpPr>
+          <p:cNvPr id="14" name="Group 13"/>
+          <p:cNvGrpSpPr/>
+          <p:nvPr/>
+        </p:nvGrpSpPr>
+        <p:grpSpPr>
+          <a:xfrm>
+            <a:off x="1173480" y="3566160"/>
+            <a:ext cx="6797040" cy="3291840"/>
+            <a:chOff x="914400" y="3566160"/>
+            <a:chExt cx="6797040" cy="3291840"/>
+          </a:xfrm>
+        </p:grpSpPr>
+        <p:pic>
+          <p:nvPicPr>
+            <p:cNvPr id="10" name="Picture 9" descr="strongC.randommultigraph.txt.png"/>
+            <p:cNvPicPr>
+              <a:picLocks noChangeAspect="1"/>
+            </p:cNvPicPr>
+            <p:nvPr/>
+          </p:nvPicPr>
+          <p:blipFill>
+            <a:blip r:embed="rId2" cstate="print"/>
+            <a:stretch>
+              <a:fillRect/>
+            </a:stretch>
+          </p:blipFill>
+          <p:spPr>
+            <a:xfrm>
+              <a:off x="914400" y="3566160"/>
+              <a:ext cx="3291840" cy="3291840"/>
+            </a:xfrm>
+            <a:prstGeom prst="rect">
+              <a:avLst/>
+            </a:prstGeom>
+          </p:spPr>
+        </p:pic>
+        <p:pic>
+          <p:nvPicPr>
+            <p:cNvPr id="11" name="Picture 10" descr="strongC.randompseudograph.txt.png"/>
+            <p:cNvPicPr>
+              <a:picLocks noChangeAspect="1"/>
+            </p:cNvPicPr>
+            <p:nvPr/>
+          </p:nvPicPr>
+          <p:blipFill>
+            <a:blip r:embed="rId3" cstate="print"/>
+            <a:stretch>
+              <a:fillRect/>
+            </a:stretch>
+          </p:blipFill>
+          <p:spPr>
+            <a:xfrm>
+              <a:off x="4419600" y="3566160"/>
+              <a:ext cx="3291840" cy="3291840"/>
+            </a:xfrm>
+            <a:prstGeom prst="rect">
+              <a:avLst/>
+            </a:prstGeom>
+          </p:spPr>
+        </p:pic>
+      </p:grpSp>
+      <p:grpSp>
+        <p:nvGrpSpPr>
+          <p:cNvPr id="15" name="Group 14"/>
+          <p:cNvGrpSpPr/>
+          <p:nvPr/>
+        </p:nvGrpSpPr>
+        <p:grpSpPr>
+          <a:xfrm>
+            <a:off x="1173480" y="152400"/>
+            <a:ext cx="6797040" cy="3291840"/>
+            <a:chOff x="914400" y="152400"/>
+            <a:chExt cx="6797040" cy="3291840"/>
+          </a:xfrm>
+        </p:grpSpPr>
+        <p:pic>
+          <p:nvPicPr>
+            <p:cNvPr id="12" name="Picture 11" descr="strongC.randomsimplegraph.txt.png"/>
+            <p:cNvPicPr>
+              <a:picLocks noChangeAspect="1"/>
+            </p:cNvPicPr>
+            <p:nvPr/>
+          </p:nvPicPr>
+          <p:blipFill>
+            <a:blip r:embed="rId4" cstate="print"/>
+            <a:stretch>
+              <a:fillRect/>
+            </a:stretch>
+          </p:blipFill>
+          <p:spPr>
+            <a:xfrm>
+              <a:off x="4419600" y="152400"/>
+              <a:ext cx="3291840" cy="3291840"/>
+            </a:xfrm>
+            <a:prstGeom prst="rect">
+              <a:avLst/>
+            </a:prstGeom>
+          </p:spPr>
+        </p:pic>
+        <p:pic>
+          <p:nvPicPr>
+            <p:cNvPr id="13" name="Picture 12" descr="strongC.TestV500E45K.bench.png"/>
+            <p:cNvPicPr>
+              <a:picLocks noChangeAspect="1"/>
+            </p:cNvPicPr>
+            <p:nvPr/>
+          </p:nvPicPr>
+          <p:blipFill>
+            <a:blip r:embed="rId5" cstate="print"/>
+            <a:stretch>
+              <a:fillRect/>
+            </a:stretch>
+          </p:blipFill>
+          <p:spPr>
+            <a:xfrm>
+              <a:off x="914400" y="152400"/>
+              <a:ext cx="3291840" cy="3291840"/>
+            </a:xfrm>
+            <a:prstGeom prst="rect">
+              <a:avLst/>
+            </a:prstGeom>
+          </p:spPr>
+        </p:pic>
+      </p:grpSp>
+    </p:spTree>
+  </p:cSld>
+  <p:clrMapOvr>
+    <a:masterClrMapping/>
+  </p:clrMapOvr>
+  <p:timing>
+    <p:tnLst>
+      <p:par>
+        <p:cTn id="1" dur="indefinite" restart="never" nodeType="tmRoot"/>
+      </p:par>
+    </p:tnLst>
+  </p:timing>
+</p:sld>
+</file>
+
+<file path=ppt/slides/slide15.xml><?xml version="1.0" encoding="utf-8"?>
+<p:sld xmlns:a="http://schemas.openxmlformats.org/drawingml/2006/main" xmlns:r="http://schemas.openxmlformats.org/officeDocument/2006/relationships" xmlns:p="http://schemas.openxmlformats.org/presentationml/2006/main">
+  <p:cSld>
+    <p:spTree>
+      <p:nvGrpSpPr>
+        <p:cNvPr id="1" name=""/>
+        <p:cNvGrpSpPr/>
+        <p:nvPr/>
+      </p:nvGrpSpPr>
+      <p:grpSpPr>
+        <a:xfrm>
+          <a:off x="0" y="0"/>
+          <a:ext cx="0" cy="0"/>
+          <a:chOff x="0" y="0"/>
+          <a:chExt cx="0" cy="0"/>
+        </a:xfrm>
+      </p:grpSpPr>
+      <p:sp>
+        <p:nvSpPr>
+          <p:cNvPr id="2" name="Title 1"/>
+          <p:cNvSpPr>
+            <a:spLocks noGrp="1"/>
+          </p:cNvSpPr>
+          <p:nvPr>
+            <p:ph type="title"/>
+          </p:nvPr>
+        </p:nvSpPr>
+        <p:spPr/>
+        <p:txBody>
+          <a:bodyPr/>
+          <a:lstStyle/>
+          <a:p>
+            <a:r>
+              <a:rPr lang="en-US" dirty="0" smtClean="0"/>
+              <a:t>Conclusions</a:t>
+            </a:r>
+            <a:endParaRPr lang="en-US" dirty="0"/>
+          </a:p>
+        </p:txBody>
+      </p:sp>
+      <p:sp>
+        <p:nvSpPr>
+          <p:cNvPr id="3" name="Content Placeholder 2"/>
+          <p:cNvSpPr>
+            <a:spLocks noGrp="1"/>
+          </p:cNvSpPr>
+          <p:nvPr>
+            <p:ph idx="1"/>
+          </p:nvPr>
+        </p:nvSpPr>
+        <p:spPr/>
+        <p:txBody>
+          <a:bodyPr>
+            <a:normAutofit lnSpcReduction="10000"/>
+          </a:bodyPr>
+          <a:lstStyle/>
+          <a:p>
+            <a:r>
+              <a:rPr lang="en-US" dirty="0" smtClean="0"/>
+              <a:t>GPL is at least as fast as the other implementations with the provided 500 </a:t>
+            </a:r>
+            <a:r>
+              <a:rPr lang="en-US" dirty="0" err="1" smtClean="0"/>
+              <a:t>verticy</a:t>
+            </a:r>
+            <a:r>
+              <a:rPr lang="en-US" dirty="0" smtClean="0"/>
+              <a:t> graph</a:t>
+            </a:r>
+          </a:p>
+          <a:p>
+            <a:r>
+              <a:rPr lang="en-US" dirty="0" smtClean="0"/>
+              <a:t>Maybe you get what you pay for</a:t>
+            </a:r>
+          </a:p>
+          <a:p>
+            <a:pPr lvl="1"/>
+            <a:r>
+              <a:rPr lang="en-US" dirty="0" err="1" smtClean="0"/>
+              <a:t>yFiles</a:t>
+            </a:r>
+            <a:r>
+              <a:rPr lang="en-US" dirty="0" smtClean="0"/>
+              <a:t> seems faster with arbitrary graphs </a:t>
+            </a:r>
+          </a:p>
+          <a:p>
+            <a:pPr lvl="2"/>
+            <a:r>
+              <a:rPr lang="en-US" dirty="0" smtClean="0"/>
+              <a:t>F</a:t>
+            </a:r>
+            <a:r>
+              <a:rPr lang="en-US" dirty="0" smtClean="0"/>
+              <a:t>or the price of $2,700 + $810 annual subscription (single developer price)</a:t>
+            </a:r>
+          </a:p>
+          <a:p>
+            <a:pPr lvl="2"/>
+            <a:r>
+              <a:rPr lang="en-US" dirty="0" smtClean="0"/>
+              <a:t>$18,000 + $5,400 annual subscription to peek at the source code</a:t>
+            </a:r>
+          </a:p>
+          <a:p>
+            <a:pPr lvl="2"/>
+            <a:r>
+              <a:rPr lang="en-US" dirty="0" smtClean="0"/>
+              <a:t>Be thankful for 30-day trials</a:t>
+            </a:r>
+            <a:endParaRPr lang="en-US" dirty="0"/>
+          </a:p>
+        </p:txBody>
+      </p:sp>
+    </p:spTree>
+  </p:cSld>
+  <p:clrMapOvr>
+    <a:masterClrMapping/>
+  </p:clrMapOvr>
+  <p:timing>
+    <p:tnLst>
+      <p:par>
+        <p:cTn id="1" dur="indefinite" restart="never" nodeType="tmRoot"/>
+      </p:par>
+    </p:tnLst>
+  </p:timing>
+</p:sld>
+</file>
+
+<file path=ppt/slides/slide16.xml><?xml version="1.0" encoding="utf-8"?>
+<p:sld xmlns:a="http://schemas.openxmlformats.org/drawingml/2006/main" xmlns:r="http://schemas.openxmlformats.org/officeDocument/2006/relationships" xmlns:p="http://schemas.openxmlformats.org/presentationml/2006/main">
+  <p:cSld>
+    <p:spTree>
+      <p:nvGrpSpPr>
+        <p:cNvPr id="1" name=""/>
+        <p:cNvGrpSpPr/>
+        <p:nvPr/>
+      </p:nvGrpSpPr>
+      <p:grpSpPr>
+        <a:xfrm>
+          <a:off x="0" y="0"/>
+          <a:ext cx="0" cy="0"/>
+          <a:chOff x="0" y="0"/>
+          <a:chExt cx="0" cy="0"/>
+        </a:xfrm>
+      </p:grpSpPr>
+      <p:sp>
+        <p:nvSpPr>
+          <p:cNvPr id="2" name="Title 1"/>
+          <p:cNvSpPr>
+            <a:spLocks noGrp="1"/>
+          </p:cNvSpPr>
+          <p:nvPr>
+            <p:ph type="title"/>
+          </p:nvPr>
+        </p:nvSpPr>
+        <p:spPr/>
+        <p:txBody>
+          <a:bodyPr/>
+          <a:lstStyle/>
+          <a:p>
+            <a:r>
+              <a:rPr lang="en-US" dirty="0" smtClean="0"/>
+              <a:t>Future Work</a:t>
+            </a:r>
+            <a:endParaRPr lang="en-US" dirty="0"/>
+          </a:p>
+        </p:txBody>
+      </p:sp>
+      <p:sp>
+        <p:nvSpPr>
+          <p:cNvPr id="3" name="Content Placeholder 2"/>
+          <p:cNvSpPr>
+            <a:spLocks noGrp="1"/>
+          </p:cNvSpPr>
+          <p:nvPr>
+            <p:ph idx="1"/>
+          </p:nvPr>
+        </p:nvSpPr>
+        <p:spPr/>
+        <p:txBody>
+          <a:bodyPr/>
+          <a:lstStyle/>
+          <a:p>
+            <a:r>
+              <a:rPr lang="en-US" dirty="0" err="1" smtClean="0"/>
+              <a:t>WebGuiDsl</a:t>
+            </a:r>
+            <a:r>
+              <a:rPr lang="en-US" dirty="0" smtClean="0"/>
+              <a:t> for GPL can be generalized for any feature model</a:t>
+            </a:r>
+          </a:p>
+          <a:p>
+            <a:pPr lvl="1"/>
+            <a:r>
+              <a:rPr lang="en-US" dirty="0" smtClean="0"/>
+              <a:t>Only client code would change</a:t>
+            </a:r>
+          </a:p>
+          <a:p>
+            <a:pPr lvl="1"/>
+            <a:r>
+              <a:rPr lang="en-US" dirty="0" smtClean="0"/>
+              <a:t>Currently webguidsl.js has GPL specific code</a:t>
+            </a:r>
+            <a:endParaRPr lang="en-US" dirty="0"/>
+          </a:p>
+        </p:txBody>
+      </p:sp>
+      <p:grpSp>
+        <p:nvGrpSpPr>
+          <p:cNvPr id="13" name="Group 12"/>
+          <p:cNvGrpSpPr/>
+          <p:nvPr/>
+        </p:nvGrpSpPr>
+        <p:grpSpPr>
+          <a:xfrm>
+            <a:off x="1219200" y="4416723"/>
+            <a:ext cx="6705600" cy="923330"/>
+            <a:chOff x="1173145" y="4322802"/>
+            <a:chExt cx="6705600" cy="923330"/>
+          </a:xfrm>
+        </p:grpSpPr>
+        <p:sp>
+          <p:nvSpPr>
+            <p:cNvPr id="5" name="Rounded Rectangle 4"/>
+            <p:cNvSpPr/>
+            <p:nvPr/>
+          </p:nvSpPr>
+          <p:spPr>
+            <a:xfrm>
+              <a:off x="3124200" y="4322802"/>
+              <a:ext cx="1676400" cy="914400"/>
+            </a:xfrm>
+            <a:prstGeom prst="roundRect">
+              <a:avLst>
+                <a:gd name="adj" fmla="val 8875"/>
+              </a:avLst>
+            </a:prstGeom>
+            <a:ln>
+              <a:solidFill>
+                <a:schemeClr val="accent1">
+                  <a:lumMod val="75000"/>
+                </a:schemeClr>
+              </a:solidFill>
+            </a:ln>
+          </p:spPr>
+          <p:style>
+            <a:lnRef idx="2">
+              <a:schemeClr val="accent6"/>
+            </a:lnRef>
+            <a:fillRef idx="1">
+              <a:schemeClr val="lt1"/>
+            </a:fillRef>
+            <a:effectRef idx="0">
+              <a:schemeClr val="accent6"/>
+            </a:effectRef>
+            <a:fontRef idx="minor">
+              <a:schemeClr val="dk1"/>
+            </a:fontRef>
+          </p:style>
+          <p:txBody>
+            <a:bodyPr rtlCol="0" anchor="ctr"/>
+            <a:lstStyle/>
+            <a:p>
+              <a:pPr algn="ctr"/>
+              <a:endParaRPr lang="en-US"/>
+            </a:p>
+          </p:txBody>
+        </p:sp>
+        <p:sp>
+          <p:nvSpPr>
+            <p:cNvPr id="6" name="TextBox 5"/>
+            <p:cNvSpPr txBox="1"/>
+            <p:nvPr/>
+          </p:nvSpPr>
+          <p:spPr>
+            <a:xfrm>
+              <a:off x="3124200" y="4322802"/>
+              <a:ext cx="1676400" cy="923330"/>
+            </a:xfrm>
+            <a:prstGeom prst="rect">
+              <a:avLst/>
+            </a:prstGeom>
+            <a:noFill/>
+          </p:spPr>
+          <p:txBody>
+            <a:bodyPr wrap="square" rtlCol="0">
+              <a:spAutoFit/>
+            </a:bodyPr>
+            <a:lstStyle/>
+            <a:p>
+              <a:pPr algn="ctr"/>
+              <a:r>
+                <a:rPr lang="en-US" dirty="0" smtClean="0"/>
+                <a:t>Currently</a:t>
+              </a:r>
+            </a:p>
+            <a:p>
+              <a:pPr algn="ctr"/>
+              <a:r>
+                <a:rPr lang="en-US" dirty="0" smtClean="0"/>
+                <a:t>Non-Existent </a:t>
+              </a:r>
+            </a:p>
+            <a:p>
+              <a:pPr algn="ctr"/>
+              <a:r>
+                <a:rPr lang="en-US" dirty="0" smtClean="0"/>
+                <a:t>Tool</a:t>
+              </a:r>
+              <a:endParaRPr lang="en-US" dirty="0"/>
+            </a:p>
+          </p:txBody>
+        </p:sp>
+        <p:sp>
+          <p:nvSpPr>
+            <p:cNvPr id="7" name="TextBox 6"/>
+            <p:cNvSpPr txBox="1"/>
+            <p:nvPr/>
+          </p:nvSpPr>
+          <p:spPr>
+            <a:xfrm>
+              <a:off x="1173145" y="4601389"/>
+              <a:ext cx="1371600" cy="369332"/>
+            </a:xfrm>
+            <a:prstGeom prst="rect">
+              <a:avLst/>
+            </a:prstGeom>
+            <a:noFill/>
+          </p:spPr>
+          <p:txBody>
+            <a:bodyPr wrap="square" rtlCol="0">
+              <a:spAutoFit/>
+            </a:bodyPr>
+            <a:lstStyle/>
+            <a:p>
+              <a:r>
+                <a:rPr lang="en-US" dirty="0" err="1" smtClean="0"/>
+                <a:t>mymodel.m</a:t>
+              </a:r>
+              <a:endParaRPr lang="en-US" dirty="0"/>
+            </a:p>
+          </p:txBody>
+        </p:sp>
+        <p:cxnSp>
+          <p:nvCxnSpPr>
+            <p:cNvPr id="9" name="Straight Arrow Connector 8"/>
+            <p:cNvCxnSpPr>
+              <a:stCxn id="7" idx="3"/>
+              <a:endCxn id="6" idx="1"/>
+            </p:cNvCxnSpPr>
+            <p:nvPr/>
+          </p:nvCxnSpPr>
+          <p:spPr>
+            <a:xfrm flipV="1">
+              <a:off x="2544745" y="4784467"/>
+              <a:ext cx="579455" cy="1588"/>
+            </a:xfrm>
+            <a:prstGeom prst="straightConnector1">
+              <a:avLst/>
+            </a:prstGeom>
+            <a:ln>
+              <a:solidFill>
+                <a:schemeClr val="tx1"/>
+              </a:solidFill>
+              <a:tailEnd type="arrow"/>
+            </a:ln>
+          </p:spPr>
+          <p:style>
+            <a:lnRef idx="1">
+              <a:schemeClr val="accent1"/>
+            </a:lnRef>
+            <a:fillRef idx="0">
+              <a:schemeClr val="accent1"/>
+            </a:fillRef>
+            <a:effectRef idx="0">
+              <a:schemeClr val="accent1"/>
+            </a:effectRef>
+            <a:fontRef idx="minor">
+              <a:schemeClr val="tx1"/>
+            </a:fontRef>
+          </p:style>
+        </p:cxnSp>
+        <p:sp>
+          <p:nvSpPr>
+            <p:cNvPr id="11" name="TextBox 10"/>
+            <p:cNvSpPr txBox="1"/>
+            <p:nvPr/>
+          </p:nvSpPr>
+          <p:spPr>
+            <a:xfrm>
+              <a:off x="5592745" y="4322802"/>
+              <a:ext cx="1600200" cy="369332"/>
+            </a:xfrm>
+            <a:prstGeom prst="rect">
+              <a:avLst/>
+            </a:prstGeom>
+            <a:noFill/>
+          </p:spPr>
+          <p:txBody>
+            <a:bodyPr wrap="square" rtlCol="0">
+              <a:spAutoFit/>
+            </a:bodyPr>
+            <a:lstStyle/>
+            <a:p>
+              <a:r>
+                <a:rPr lang="en-US" dirty="0" smtClean="0"/>
+                <a:t>mymodel.html</a:t>
+              </a:r>
+              <a:endParaRPr lang="en-US" dirty="0"/>
+            </a:p>
+          </p:txBody>
+        </p:sp>
+        <p:sp>
+          <p:nvSpPr>
+            <p:cNvPr id="12" name="TextBox 11"/>
+            <p:cNvSpPr txBox="1"/>
+            <p:nvPr/>
+          </p:nvSpPr>
+          <p:spPr>
+            <a:xfrm>
+              <a:off x="5592745" y="4876800"/>
+              <a:ext cx="2286000" cy="369332"/>
+            </a:xfrm>
+            <a:prstGeom prst="rect">
+              <a:avLst/>
+            </a:prstGeom>
+            <a:noFill/>
+          </p:spPr>
+          <p:txBody>
+            <a:bodyPr wrap="square" rtlCol="0">
+              <a:spAutoFit/>
+            </a:bodyPr>
+            <a:lstStyle/>
+            <a:p>
+              <a:r>
+                <a:rPr lang="en-US" dirty="0" smtClean="0"/>
+                <a:t>validatemymodel.js</a:t>
+              </a:r>
+              <a:endParaRPr lang="en-US" dirty="0"/>
+            </a:p>
+          </p:txBody>
+        </p:sp>
+        <p:cxnSp>
+          <p:nvCxnSpPr>
+            <p:cNvPr id="24" name="Straight Arrow Connector 23"/>
+            <p:cNvCxnSpPr>
+              <a:stCxn id="6" idx="3"/>
+              <a:endCxn id="11" idx="1"/>
+            </p:cNvCxnSpPr>
+            <p:nvPr/>
+          </p:nvCxnSpPr>
+          <p:spPr>
+            <a:xfrm flipV="1">
+              <a:off x="4800600" y="4507468"/>
+              <a:ext cx="792145" cy="276999"/>
+            </a:xfrm>
+            <a:prstGeom prst="straightConnector1">
+              <a:avLst/>
+            </a:prstGeom>
+            <a:ln>
+              <a:solidFill>
+                <a:schemeClr val="tx1"/>
+              </a:solidFill>
+              <a:tailEnd type="arrow"/>
+            </a:ln>
+          </p:spPr>
+          <p:style>
+            <a:lnRef idx="1">
+              <a:schemeClr val="accent1"/>
+            </a:lnRef>
+            <a:fillRef idx="0">
+              <a:schemeClr val="accent1"/>
+            </a:fillRef>
+            <a:effectRef idx="0">
+              <a:schemeClr val="accent1"/>
+            </a:effectRef>
+            <a:fontRef idx="minor">
+              <a:schemeClr val="tx1"/>
+            </a:fontRef>
+          </p:style>
+        </p:cxnSp>
+        <p:cxnSp>
+          <p:nvCxnSpPr>
+            <p:cNvPr id="26" name="Straight Arrow Connector 25"/>
+            <p:cNvCxnSpPr>
+              <a:stCxn id="6" idx="3"/>
+              <a:endCxn id="12" idx="1"/>
+            </p:cNvCxnSpPr>
+            <p:nvPr/>
+          </p:nvCxnSpPr>
+          <p:spPr>
+            <a:xfrm>
+              <a:off x="4800600" y="4784467"/>
+              <a:ext cx="792145" cy="276999"/>
+            </a:xfrm>
+            <a:prstGeom prst="straightConnector1">
+              <a:avLst/>
+            </a:prstGeom>
+            <a:ln>
+              <a:solidFill>
+                <a:schemeClr val="tx1"/>
+              </a:solidFill>
+              <a:tailEnd type="arrow"/>
+            </a:ln>
+          </p:spPr>
+          <p:style>
+            <a:lnRef idx="1">
+              <a:schemeClr val="accent1"/>
+            </a:lnRef>
+            <a:fillRef idx="0">
+              <a:schemeClr val="accent1"/>
+            </a:fillRef>
+            <a:effectRef idx="0">
+              <a:schemeClr val="accent1"/>
+            </a:effectRef>
+            <a:fontRef idx="minor">
+              <a:schemeClr val="tx1"/>
+            </a:fontRef>
+          </p:style>
+        </p:cxnSp>
+      </p:grpSp>
+    </p:spTree>
+  </p:cSld>
+  <p:clrMapOvr>
+    <a:masterClrMapping/>
+  </p:clrMapOvr>
+  <p:timing>
+    <p:tnLst>
+      <p:par>
+        <p:cTn id="1" dur="indefinite" restart="never" nodeType="tmRoot"/>
+      </p:par>
+    </p:tnLst>
   </p:timing>
 </p:sld>
 </file>
@@ -6516,11 +7149,7 @@
             <a:pPr lvl="1"/>
             <a:r>
               <a:rPr lang="en-US" dirty="0" smtClean="0"/>
-              <a:t>Provides a method that calls SAT solver for a given number of set variables and returns a 2D JSON array consisting of variable values (set/not set) and reasons for the </a:t>
-            </a:r>
-            <a:r>
-              <a:rPr lang="en-US" dirty="0" smtClean="0"/>
-              <a:t>values</a:t>
+              <a:t>Provides a method that calls SAT solver for a given number of set variables and returns a 2D JSON array consisting of variable values (set/not set) and reasons for the values</a:t>
             </a:r>
           </a:p>
           <a:p>

</xml_diff>

<commit_message>
Fixed plots. presentation update
</commit_message>
<xml_diff>
--- a/SamPresentation.pptx
+++ b/SamPresentation.pptx
@@ -4669,13 +4669,11 @@
       </p:grpSpPr>
       <p:pic>
         <p:nvPicPr>
-          <p:cNvPr id="4" name="Content Placeholder 3" descr="cycle.randommultigraph.txt.png"/>
+          <p:cNvPr id="12" name="Picture 11" descr="cycle.randommultigraph.txt.png"/>
           <p:cNvPicPr>
-            <a:picLocks noGrp="1" noChangeAspect="1"/>
+            <a:picLocks noChangeAspect="1"/>
           </p:cNvPicPr>
-          <p:nvPr>
-            <p:ph idx="1"/>
-          </p:nvPr>
+          <p:nvPr/>
         </p:nvPicPr>
         <p:blipFill>
           <a:blip r:embed="rId2" cstate="print"/>
@@ -4688,11 +4686,14 @@
             <a:off x="0" y="3566160"/>
             <a:ext cx="3291840" cy="3291840"/>
           </a:xfrm>
+          <a:prstGeom prst="rect">
+            <a:avLst/>
+          </a:prstGeom>
         </p:spPr>
       </p:pic>
       <p:pic>
         <p:nvPicPr>
-          <p:cNvPr id="5" name="Picture 4" descr="cycle.randompseudograph.txt.png"/>
+          <p:cNvPr id="13" name="Picture 12" descr="cycle.randompseudograph.txt.png"/>
           <p:cNvPicPr>
             <a:picLocks noChangeAspect="1"/>
           </p:cNvPicPr>
@@ -4706,7 +4707,7 @@
         </p:blipFill>
         <p:spPr>
           <a:xfrm>
-            <a:off x="2926080" y="3566160"/>
+            <a:off x="3124200" y="3566160"/>
             <a:ext cx="3291840" cy="3291840"/>
           </a:xfrm>
           <a:prstGeom prst="rect">
@@ -4716,7 +4717,7 @@
       </p:pic>
       <p:pic>
         <p:nvPicPr>
-          <p:cNvPr id="7" name="Picture 6" descr="cycle.simplelineargraph.txt.png"/>
+          <p:cNvPr id="15" name="Picture 14" descr="cycle.simplelineargraph.txt.png"/>
           <p:cNvPicPr>
             <a:picLocks noChangeAspect="1"/>
           </p:cNvPicPr>
@@ -4730,7 +4731,7 @@
         </p:blipFill>
         <p:spPr>
           <a:xfrm>
-            <a:off x="6019800" y="3566160"/>
+            <a:off x="6096000" y="3566160"/>
             <a:ext cx="3291840" cy="3291840"/>
           </a:xfrm>
           <a:prstGeom prst="rect">
@@ -4740,21 +4741,21 @@
       </p:pic>
       <p:grpSp>
         <p:nvGrpSpPr>
-          <p:cNvPr id="10" name="Group 9"/>
+          <p:cNvPr id="17" name="Group 16"/>
           <p:cNvGrpSpPr/>
           <p:nvPr/>
         </p:nvGrpSpPr>
         <p:grpSpPr>
           <a:xfrm>
-            <a:off x="1280160" y="175418"/>
-            <a:ext cx="6583680" cy="3291840"/>
-            <a:chOff x="464662" y="91440"/>
-            <a:chExt cx="6583680" cy="3291840"/>
+            <a:off x="1287780" y="0"/>
+            <a:ext cx="6568440" cy="3291840"/>
+            <a:chOff x="1371600" y="0"/>
+            <a:chExt cx="6568440" cy="3291840"/>
           </a:xfrm>
         </p:grpSpPr>
         <p:pic>
           <p:nvPicPr>
-            <p:cNvPr id="6" name="Picture 5" descr="cycle.randomsimplegraph.txt.png"/>
+            <p:cNvPr id="14" name="Picture 13" descr="cycle.randomsimplegraph.txt.png"/>
             <p:cNvPicPr>
               <a:picLocks noChangeAspect="1"/>
             </p:cNvPicPr>
@@ -4768,7 +4769,7 @@
           </p:blipFill>
           <p:spPr>
             <a:xfrm>
-              <a:off x="3756502" y="91440"/>
+              <a:off x="4648200" y="0"/>
               <a:ext cx="3291840" cy="3291840"/>
             </a:xfrm>
             <a:prstGeom prst="rect">
@@ -4778,7 +4779,7 @@
         </p:pic>
         <p:pic>
           <p:nvPicPr>
-            <p:cNvPr id="8" name="Picture 7" descr="cycle.TestV500E45K.bench.png"/>
+            <p:cNvPr id="16" name="Picture 15" descr="cycle.TestV500E45K.bench.png"/>
             <p:cNvPicPr>
               <a:picLocks noChangeAspect="1"/>
             </p:cNvPicPr>
@@ -4792,7 +4793,7 @@
           </p:blipFill>
           <p:spPr>
             <a:xfrm>
-              <a:off x="464662" y="91440"/>
+              <a:off x="1371600" y="0"/>
               <a:ext cx="3291840" cy="3291840"/>
             </a:xfrm>
             <a:prstGeom prst="rect">
@@ -4835,7 +4836,7 @@
       </p:grpSpPr>
       <p:pic>
         <p:nvPicPr>
-          <p:cNvPr id="10" name="Picture 9" descr="connected.randommultigraph.txt.png"/>
+          <p:cNvPr id="21" name="Picture 20" descr="connected.simplelineargraph.txt.png"/>
           <p:cNvPicPr>
             <a:picLocks noChangeAspect="1"/>
           </p:cNvPicPr>
@@ -4843,6 +4844,124 @@
         </p:nvPicPr>
         <p:blipFill>
           <a:blip r:embed="rId2" cstate="print"/>
+          <a:stretch>
+            <a:fillRect/>
+          </a:stretch>
+        </p:blipFill>
+        <p:spPr>
+          <a:xfrm>
+            <a:off x="6096000" y="3566160"/>
+            <a:ext cx="3291840" cy="3291840"/>
+          </a:xfrm>
+          <a:prstGeom prst="rect">
+            <a:avLst/>
+          </a:prstGeom>
+        </p:spPr>
+      </p:pic>
+      <p:sp>
+        <p:nvSpPr>
+          <p:cNvPr id="16" name="Oval 15"/>
+          <p:cNvSpPr/>
+          <p:nvPr/>
+        </p:nvSpPr>
+        <p:spPr>
+          <a:xfrm>
+            <a:off x="6477000" y="6019800"/>
+            <a:ext cx="1737360" cy="609600"/>
+          </a:xfrm>
+          <a:prstGeom prst="ellipse">
+            <a:avLst/>
+          </a:prstGeom>
+          <a:noFill/>
+          <a:ln>
+            <a:solidFill>
+              <a:srgbClr val="FF0000"/>
+            </a:solidFill>
+          </a:ln>
+        </p:spPr>
+        <p:style>
+          <a:lnRef idx="2">
+            <a:schemeClr val="accent6"/>
+          </a:lnRef>
+          <a:fillRef idx="1">
+            <a:schemeClr val="lt1"/>
+          </a:fillRef>
+          <a:effectRef idx="0">
+            <a:schemeClr val="accent6"/>
+          </a:effectRef>
+          <a:fontRef idx="minor">
+            <a:schemeClr val="dk1"/>
+          </a:fontRef>
+        </p:style>
+        <p:txBody>
+          <a:bodyPr rtlCol="0" anchor="ctr"/>
+          <a:lstStyle/>
+          <a:p>
+            <a:pPr algn="ctr"/>
+            <a:endParaRPr lang="en-US"/>
+          </a:p>
+        </p:txBody>
+      </p:sp>
+      <p:sp>
+        <p:nvSpPr>
+          <p:cNvPr id="17" name="TextBox 16"/>
+          <p:cNvSpPr txBox="1"/>
+          <p:nvPr/>
+        </p:nvSpPr>
+        <p:spPr>
+          <a:xfrm>
+            <a:off x="6629400" y="5257800"/>
+            <a:ext cx="1437445" cy="646331"/>
+          </a:xfrm>
+          <a:prstGeom prst="rect">
+            <a:avLst/>
+          </a:prstGeom>
+          <a:noFill/>
+        </p:spPr>
+        <p:txBody>
+          <a:bodyPr wrap="none" rtlCol="0">
+            <a:spAutoFit/>
+          </a:bodyPr>
+          <a:lstStyle/>
+          <a:p>
+            <a:pPr algn="ctr"/>
+            <a:r>
+              <a:rPr lang="en-US" dirty="0" smtClean="0">
+                <a:solidFill>
+                  <a:srgbClr val="FF0000"/>
+                </a:solidFill>
+              </a:rPr>
+              <a:t>No statistical </a:t>
+            </a:r>
+          </a:p>
+          <a:p>
+            <a:pPr algn="ctr"/>
+            <a:r>
+              <a:rPr lang="en-US" dirty="0" smtClean="0">
+                <a:solidFill>
+                  <a:srgbClr val="FF0000"/>
+                </a:solidFill>
+              </a:rPr>
+              <a:t>difference</a:t>
+            </a:r>
+            <a:endParaRPr lang="en-US" dirty="0">
+              <a:solidFill>
+                <a:srgbClr val="FF0000"/>
+              </a:solidFill>
+            </a:endParaRPr>
+          </a:p>
+        </p:txBody>
+      </p:sp>
+      <p:pic>
+        <p:nvPicPr>
+          <p:cNvPr id="18" name="Picture 17" descr="connected.randommultigraph.txt.png"/>
+          <p:cNvPicPr>
+            <a:picLocks noChangeAspect="1"/>
+          </p:cNvPicPr>
+          <p:nvPr/>
+        </p:nvPicPr>
+        <p:blipFill>
+          <a:blip r:embed="rId3" cstate="print"/>
           <a:stretch>
             <a:fillRect/>
           </a:stretch>
@@ -4859,14 +4978,14 @@
       </p:pic>
       <p:pic>
         <p:nvPicPr>
-          <p:cNvPr id="11" name="Picture 10" descr="connected.randompseudograph.txt.png"/>
+          <p:cNvPr id="19" name="Picture 18" descr="connected.randompseudograph.txt.png"/>
           <p:cNvPicPr>
             <a:picLocks noChangeAspect="1"/>
           </p:cNvPicPr>
           <p:nvPr/>
         </p:nvPicPr>
         <p:blipFill>
-          <a:blip r:embed="rId3" cstate="print"/>
+          <a:blip r:embed="rId4" cstate="print"/>
           <a:stretch>
             <a:fillRect/>
           </a:stretch>
@@ -4881,47 +5000,23 @@
           </a:prstGeom>
         </p:spPr>
       </p:pic>
-      <p:pic>
-        <p:nvPicPr>
-          <p:cNvPr id="13" name="Picture 12" descr="connected.simplelineargraph.txt.png"/>
-          <p:cNvPicPr>
-            <a:picLocks noChangeAspect="1"/>
-          </p:cNvPicPr>
-          <p:nvPr/>
-        </p:nvPicPr>
-        <p:blipFill>
-          <a:blip r:embed="rId4" cstate="print"/>
-          <a:stretch>
-            <a:fillRect/>
-          </a:stretch>
-        </p:blipFill>
-        <p:spPr>
-          <a:xfrm>
-            <a:off x="6096000" y="3566160"/>
-            <a:ext cx="3291840" cy="3291840"/>
-          </a:xfrm>
-          <a:prstGeom prst="rect">
-            <a:avLst/>
-          </a:prstGeom>
-        </p:spPr>
-      </p:pic>
       <p:grpSp>
         <p:nvGrpSpPr>
-          <p:cNvPr id="15" name="Group 14"/>
+          <p:cNvPr id="23" name="Group 22"/>
           <p:cNvGrpSpPr/>
           <p:nvPr/>
         </p:nvGrpSpPr>
         <p:grpSpPr>
           <a:xfrm>
-            <a:off x="1280160" y="274320"/>
-            <a:ext cx="6583680" cy="3291840"/>
-            <a:chOff x="0" y="0"/>
-            <a:chExt cx="6583680" cy="3291840"/>
+            <a:off x="1287780" y="0"/>
+            <a:ext cx="6568440" cy="3291840"/>
+            <a:chOff x="1600200" y="0"/>
+            <a:chExt cx="6568440" cy="3291840"/>
           </a:xfrm>
         </p:grpSpPr>
         <p:pic>
           <p:nvPicPr>
-            <p:cNvPr id="12" name="Picture 11" descr="connected.randomsimplegraph.txt.png"/>
+            <p:cNvPr id="20" name="Picture 19" descr="connected.randomsimplegraph.txt.png"/>
             <p:cNvPicPr>
               <a:picLocks noChangeAspect="1"/>
             </p:cNvPicPr>
@@ -4935,7 +5030,7 @@
           </p:blipFill>
           <p:spPr>
             <a:xfrm>
-              <a:off x="3291840" y="0"/>
+              <a:off x="4876800" y="0"/>
               <a:ext cx="3291840" cy="3291840"/>
             </a:xfrm>
             <a:prstGeom prst="rect">
@@ -4945,7 +5040,7 @@
         </p:pic>
         <p:pic>
           <p:nvPicPr>
-            <p:cNvPr id="14" name="Picture 13" descr="connected.TestV500E45K.bench.png"/>
+            <p:cNvPr id="22" name="Picture 21" descr="connected.TestV500E45K.bench.png"/>
             <p:cNvPicPr>
               <a:picLocks noChangeAspect="1"/>
             </p:cNvPicPr>
@@ -4959,7 +5054,7 @@
           </p:blipFill>
           <p:spPr>
             <a:xfrm>
-              <a:off x="0" y="0"/>
+              <a:off x="1600200" y="0"/>
               <a:ext cx="3291840" cy="3291840"/>
             </a:xfrm>
             <a:prstGeom prst="rect">
@@ -5002,7 +5097,7 @@
       </p:grpSpPr>
       <p:pic>
         <p:nvPicPr>
-          <p:cNvPr id="11" name="Picture 10" descr="mstPrim.randommultigraph.txt.png"/>
+          <p:cNvPr id="23" name="Picture 22" descr="mstPrim.randommultigraph.txt.png"/>
           <p:cNvPicPr>
             <a:picLocks noChangeAspect="1"/>
           </p:cNvPicPr>
@@ -5026,7 +5121,7 @@
       </p:pic>
       <p:pic>
         <p:nvPicPr>
-          <p:cNvPr id="12" name="Picture 11" descr="mstPrim.randompseudograph.txt.png"/>
+          <p:cNvPr id="24" name="Picture 23" descr="mstPrim.randompseudograph.txt.png"/>
           <p:cNvPicPr>
             <a:picLocks noChangeAspect="1"/>
           </p:cNvPicPr>
@@ -5040,7 +5135,7 @@
         </p:blipFill>
         <p:spPr>
           <a:xfrm>
-            <a:off x="3048000" y="3566160"/>
+            <a:off x="2971800" y="3566160"/>
             <a:ext cx="3291840" cy="3291840"/>
           </a:xfrm>
           <a:prstGeom prst="rect">
@@ -5050,7 +5145,7 @@
       </p:pic>
       <p:pic>
         <p:nvPicPr>
-          <p:cNvPr id="14" name="Picture 13" descr="mstPrim.simplelineargraph.txt.png"/>
+          <p:cNvPr id="26" name="Picture 25" descr="mstPrim.simplelineargraph.txt.png"/>
           <p:cNvPicPr>
             <a:picLocks noChangeAspect="1"/>
           </p:cNvPicPr>
@@ -5064,7 +5159,7 @@
         </p:blipFill>
         <p:spPr>
           <a:xfrm>
-            <a:off x="6096000" y="3566160"/>
+            <a:off x="6019800" y="3566160"/>
             <a:ext cx="3291840" cy="3291840"/>
           </a:xfrm>
           <a:prstGeom prst="rect">
@@ -5074,21 +5169,21 @@
       </p:pic>
       <p:grpSp>
         <p:nvGrpSpPr>
-          <p:cNvPr id="16" name="Group 15"/>
+          <p:cNvPr id="28" name="Group 27"/>
           <p:cNvGrpSpPr/>
           <p:nvPr/>
         </p:nvGrpSpPr>
         <p:grpSpPr>
           <a:xfrm>
-            <a:off x="1280160" y="124320"/>
-            <a:ext cx="6583680" cy="3291840"/>
-            <a:chOff x="609600" y="124320"/>
-            <a:chExt cx="6583680" cy="3291840"/>
+            <a:off x="1287780" y="0"/>
+            <a:ext cx="6568440" cy="3291840"/>
+            <a:chOff x="990600" y="0"/>
+            <a:chExt cx="6568440" cy="3291840"/>
           </a:xfrm>
         </p:grpSpPr>
         <p:pic>
           <p:nvPicPr>
-            <p:cNvPr id="13" name="Picture 12" descr="mstPrim.randomsimplegraph.txt.png"/>
+            <p:cNvPr id="25" name="Picture 24" descr="mstPrim.randomsimplegraph.txt.png"/>
             <p:cNvPicPr>
               <a:picLocks noChangeAspect="1"/>
             </p:cNvPicPr>
@@ -5102,7 +5197,7 @@
           </p:blipFill>
           <p:spPr>
             <a:xfrm>
-              <a:off x="3901440" y="124320"/>
+              <a:off x="4267200" y="0"/>
               <a:ext cx="3291840" cy="3291840"/>
             </a:xfrm>
             <a:prstGeom prst="rect">
@@ -5112,7 +5207,7 @@
         </p:pic>
         <p:pic>
           <p:nvPicPr>
-            <p:cNvPr id="15" name="Picture 14" descr="mstPrim.TestV500E45K.bench.png"/>
+            <p:cNvPr id="27" name="Picture 26" descr="mstPrim.TestV500E45K.bench.png"/>
             <p:cNvPicPr>
               <a:picLocks noChangeAspect="1"/>
             </p:cNvPicPr>
@@ -5126,7 +5221,7 @@
           </p:blipFill>
           <p:spPr>
             <a:xfrm>
-              <a:off x="609600" y="124320"/>
+              <a:off x="990600" y="0"/>
               <a:ext cx="3291840" cy="3291840"/>
             </a:xfrm>
             <a:prstGeom prst="rect">
@@ -5169,7 +5264,7 @@
       </p:grpSpPr>
       <p:pic>
         <p:nvPicPr>
-          <p:cNvPr id="10" name="Picture 9" descr="mstKruskal.randommultigraph.txt.png"/>
+          <p:cNvPr id="16" name="Picture 15" descr="mstKruskal.randommultigraph.txt.png"/>
           <p:cNvPicPr>
             <a:picLocks noChangeAspect="1"/>
           </p:cNvPicPr>
@@ -5193,7 +5288,7 @@
       </p:pic>
       <p:pic>
         <p:nvPicPr>
-          <p:cNvPr id="11" name="Picture 10" descr="mstKruskal.randompseudograph.txt.png"/>
+          <p:cNvPr id="17" name="Picture 16" descr="mstKruskal.randompseudograph.txt.png"/>
           <p:cNvPicPr>
             <a:picLocks noChangeAspect="1"/>
           </p:cNvPicPr>
@@ -5207,7 +5302,7 @@
         </p:blipFill>
         <p:spPr>
           <a:xfrm>
-            <a:off x="3124200" y="3566160"/>
+            <a:off x="3048000" y="3566160"/>
             <a:ext cx="3291840" cy="3291840"/>
           </a:xfrm>
           <a:prstGeom prst="rect">
@@ -5217,7 +5312,7 @@
       </p:pic>
       <p:pic>
         <p:nvPicPr>
-          <p:cNvPr id="13" name="Picture 12" descr="mstKruskal.simplelineargraph.txt.png"/>
+          <p:cNvPr id="19" name="Picture 18" descr="mstKruskal.simplelineargraph.txt.png"/>
           <p:cNvPicPr>
             <a:picLocks noChangeAspect="1"/>
           </p:cNvPicPr>
@@ -5231,7 +5326,7 @@
         </p:blipFill>
         <p:spPr>
           <a:xfrm>
-            <a:off x="6217920" y="3566160"/>
+            <a:off x="6096000" y="3566160"/>
             <a:ext cx="3291840" cy="3291840"/>
           </a:xfrm>
           <a:prstGeom prst="rect">
@@ -5241,21 +5336,21 @@
       </p:pic>
       <p:grpSp>
         <p:nvGrpSpPr>
-          <p:cNvPr id="15" name="Group 14"/>
+          <p:cNvPr id="21" name="Group 20"/>
           <p:cNvGrpSpPr/>
           <p:nvPr/>
         </p:nvGrpSpPr>
         <p:grpSpPr>
           <a:xfrm>
-            <a:off x="1280160" y="152400"/>
-            <a:ext cx="6583680" cy="3291840"/>
-            <a:chOff x="0" y="152400"/>
-            <a:chExt cx="6583680" cy="3291840"/>
+            <a:off x="1287780" y="0"/>
+            <a:ext cx="6568440" cy="3291840"/>
+            <a:chOff x="1371600" y="0"/>
+            <a:chExt cx="6568440" cy="3291840"/>
           </a:xfrm>
         </p:grpSpPr>
         <p:pic>
           <p:nvPicPr>
-            <p:cNvPr id="12" name="Picture 11" descr="mstKruskal.randomsimplegraph.txt.png"/>
+            <p:cNvPr id="18" name="Picture 17" descr="mstKruskal.randomsimplegraph.txt.png"/>
             <p:cNvPicPr>
               <a:picLocks noChangeAspect="1"/>
             </p:cNvPicPr>
@@ -5269,7 +5364,7 @@
           </p:blipFill>
           <p:spPr>
             <a:xfrm>
-              <a:off x="3291840" y="152400"/>
+              <a:off x="4648200" y="0"/>
               <a:ext cx="3291840" cy="3291840"/>
             </a:xfrm>
             <a:prstGeom prst="rect">
@@ -5279,7 +5374,7 @@
         </p:pic>
         <p:pic>
           <p:nvPicPr>
-            <p:cNvPr id="14" name="Picture 13" descr="mstKruskal.TestV500E45K.bench.png"/>
+            <p:cNvPr id="20" name="Picture 19" descr="mstKruskal.TestV500E45K.bench.png"/>
             <p:cNvPicPr>
               <a:picLocks noChangeAspect="1"/>
             </p:cNvPicPr>
@@ -5293,7 +5388,7 @@
           </p:blipFill>
           <p:spPr>
             <a:xfrm>
-              <a:off x="0" y="152400"/>
+              <a:off x="1371600" y="0"/>
               <a:ext cx="3291840" cy="3291840"/>
             </a:xfrm>
             <a:prstGeom prst="rect">
@@ -5336,21 +5431,21 @@
       </p:grpSpPr>
       <p:grpSp>
         <p:nvGrpSpPr>
-          <p:cNvPr id="14" name="Group 13"/>
+          <p:cNvPr id="20" name="Group 19"/>
           <p:cNvGrpSpPr/>
           <p:nvPr/>
         </p:nvGrpSpPr>
         <p:grpSpPr>
           <a:xfrm>
-            <a:off x="1173480" y="3566160"/>
-            <a:ext cx="6797040" cy="3291840"/>
-            <a:chOff x="914400" y="3566160"/>
-            <a:chExt cx="6797040" cy="3291840"/>
+            <a:off x="1249680" y="3566160"/>
+            <a:ext cx="6644640" cy="3291840"/>
+            <a:chOff x="1447800" y="3566160"/>
+            <a:chExt cx="6644640" cy="3291840"/>
           </a:xfrm>
         </p:grpSpPr>
         <p:pic>
           <p:nvPicPr>
-            <p:cNvPr id="10" name="Picture 9" descr="strongC.randommultigraph.txt.png"/>
+            <p:cNvPr id="16" name="Picture 15" descr="strongC.randommultigraph.txt.png"/>
             <p:cNvPicPr>
               <a:picLocks noChangeAspect="1"/>
             </p:cNvPicPr>
@@ -5364,7 +5459,7 @@
           </p:blipFill>
           <p:spPr>
             <a:xfrm>
-              <a:off x="914400" y="3566160"/>
+              <a:off x="1447800" y="3566160"/>
               <a:ext cx="3291840" cy="3291840"/>
             </a:xfrm>
             <a:prstGeom prst="rect">
@@ -5374,7 +5469,7 @@
         </p:pic>
         <p:pic>
           <p:nvPicPr>
-            <p:cNvPr id="11" name="Picture 10" descr="strongC.randompseudograph.txt.png"/>
+            <p:cNvPr id="17" name="Picture 16" descr="strongC.randompseudograph.txt.png"/>
             <p:cNvPicPr>
               <a:picLocks noChangeAspect="1"/>
             </p:cNvPicPr>
@@ -5388,7 +5483,7 @@
           </p:blipFill>
           <p:spPr>
             <a:xfrm>
-              <a:off x="4419600" y="3566160"/>
+              <a:off x="4800600" y="3566160"/>
               <a:ext cx="3291840" cy="3291840"/>
             </a:xfrm>
             <a:prstGeom prst="rect">
@@ -5399,21 +5494,21 @@
       </p:grpSp>
       <p:grpSp>
         <p:nvGrpSpPr>
-          <p:cNvPr id="15" name="Group 14"/>
+          <p:cNvPr id="21" name="Group 20"/>
           <p:cNvGrpSpPr/>
           <p:nvPr/>
         </p:nvGrpSpPr>
         <p:grpSpPr>
           <a:xfrm>
-            <a:off x="1173480" y="152400"/>
-            <a:ext cx="6797040" cy="3291840"/>
-            <a:chOff x="914400" y="152400"/>
-            <a:chExt cx="6797040" cy="3291840"/>
+            <a:off x="1249680" y="0"/>
+            <a:ext cx="6644640" cy="3291840"/>
+            <a:chOff x="1447800" y="0"/>
+            <a:chExt cx="6644640" cy="3291840"/>
           </a:xfrm>
         </p:grpSpPr>
         <p:pic>
           <p:nvPicPr>
-            <p:cNvPr id="12" name="Picture 11" descr="strongC.randomsimplegraph.txt.png"/>
+            <p:cNvPr id="18" name="Picture 17" descr="strongC.randomsimplegraph.txt.png"/>
             <p:cNvPicPr>
               <a:picLocks noChangeAspect="1"/>
             </p:cNvPicPr>
@@ -5427,7 +5522,7 @@
           </p:blipFill>
           <p:spPr>
             <a:xfrm>
-              <a:off x="4419600" y="152400"/>
+              <a:off x="4800600" y="0"/>
               <a:ext cx="3291840" cy="3291840"/>
             </a:xfrm>
             <a:prstGeom prst="rect">
@@ -5437,7 +5532,7 @@
         </p:pic>
         <p:pic>
           <p:nvPicPr>
-            <p:cNvPr id="13" name="Picture 12" descr="strongC.TestV500E45K.bench.png"/>
+            <p:cNvPr id="19" name="Picture 18" descr="strongC.TestV500E45K.bench.png"/>
             <p:cNvPicPr>
               <a:picLocks noChangeAspect="1"/>
             </p:cNvPicPr>
@@ -5451,7 +5546,7 @@
           </p:blipFill>
           <p:spPr>
             <a:xfrm>
-              <a:off x="914400" y="152400"/>
+              <a:off x="1447800" y="0"/>
               <a:ext cx="3291840" cy="3291840"/>
             </a:xfrm>
             <a:prstGeom prst="rect">
@@ -5534,7 +5629,15 @@
           <a:p>
             <a:r>
               <a:rPr lang="en-US" dirty="0" smtClean="0"/>
-              <a:t>GPL is at least as fast as the other implementations with the provided 500 </a:t>
+              <a:t>GPL is at least as fast as the other implementations for most </a:t>
+            </a:r>
+            <a:r>
+              <a:rPr lang="en-US" dirty="0" err="1" smtClean="0"/>
+              <a:t>algorithmswith</a:t>
+            </a:r>
+            <a:r>
+              <a:rPr lang="en-US" dirty="0" smtClean="0"/>
+              <a:t> the provided 500 </a:t>
             </a:r>
             <a:r>
               <a:rPr lang="en-US" dirty="0" err="1" smtClean="0"/>

</xml_diff>